<commit_message>
draft of second prac solutions is done done
</commit_message>
<xml_diff>
--- a/docs/articles/resources/SHLIR_real_model.pptx
+++ b/docs/articles/resources/SHLIR_real_model.pptx
@@ -197,7 +197,7 @@
           <a:p>
             <a:fld id="{3CEAADBD-62E5-2F4A-A94D-5F96F99DEFF4}" type="datetimeFigureOut">
               <a:rPr lang="en-GB" smtClean="0"/>
-              <a:t>06/12/2017</a:t>
+              <a:t>10/01/2018</a:t>
             </a:fld>
             <a:endParaRPr lang="en-GB"/>
           </a:p>
@@ -596,7 +596,7 @@
           <a:p>
             <a:fld id="{A79B0C5A-868C-EC4F-B227-B0E7EEAFAF2D}" type="datetimeFigureOut">
               <a:rPr lang="en-GB" smtClean="0"/>
-              <a:t>06/12/2017</a:t>
+              <a:t>10/01/2018</a:t>
             </a:fld>
             <a:endParaRPr lang="en-GB"/>
           </a:p>
@@ -766,7 +766,7 @@
           <a:p>
             <a:fld id="{A79B0C5A-868C-EC4F-B227-B0E7EEAFAF2D}" type="datetimeFigureOut">
               <a:rPr lang="en-GB" smtClean="0"/>
-              <a:t>06/12/2017</a:t>
+              <a:t>10/01/2018</a:t>
             </a:fld>
             <a:endParaRPr lang="en-GB"/>
           </a:p>
@@ -946,7 +946,7 @@
           <a:p>
             <a:fld id="{A79B0C5A-868C-EC4F-B227-B0E7EEAFAF2D}" type="datetimeFigureOut">
               <a:rPr lang="en-GB" smtClean="0"/>
-              <a:t>06/12/2017</a:t>
+              <a:t>10/01/2018</a:t>
             </a:fld>
             <a:endParaRPr lang="en-GB"/>
           </a:p>
@@ -1116,7 +1116,7 @@
           <a:p>
             <a:fld id="{A79B0C5A-868C-EC4F-B227-B0E7EEAFAF2D}" type="datetimeFigureOut">
               <a:rPr lang="en-GB" smtClean="0"/>
-              <a:t>06/12/2017</a:t>
+              <a:t>10/01/2018</a:t>
             </a:fld>
             <a:endParaRPr lang="en-GB"/>
           </a:p>
@@ -1362,7 +1362,7 @@
           <a:p>
             <a:fld id="{A79B0C5A-868C-EC4F-B227-B0E7EEAFAF2D}" type="datetimeFigureOut">
               <a:rPr lang="en-GB" smtClean="0"/>
-              <a:t>06/12/2017</a:t>
+              <a:t>10/01/2018</a:t>
             </a:fld>
             <a:endParaRPr lang="en-GB"/>
           </a:p>
@@ -1594,7 +1594,7 @@
           <a:p>
             <a:fld id="{A79B0C5A-868C-EC4F-B227-B0E7EEAFAF2D}" type="datetimeFigureOut">
               <a:rPr lang="en-GB" smtClean="0"/>
-              <a:t>06/12/2017</a:t>
+              <a:t>10/01/2018</a:t>
             </a:fld>
             <a:endParaRPr lang="en-GB"/>
           </a:p>
@@ -1961,7 +1961,7 @@
           <a:p>
             <a:fld id="{A79B0C5A-868C-EC4F-B227-B0E7EEAFAF2D}" type="datetimeFigureOut">
               <a:rPr lang="en-GB" smtClean="0"/>
-              <a:t>06/12/2017</a:t>
+              <a:t>10/01/2018</a:t>
             </a:fld>
             <a:endParaRPr lang="en-GB"/>
           </a:p>
@@ -2079,7 +2079,7 @@
           <a:p>
             <a:fld id="{A79B0C5A-868C-EC4F-B227-B0E7EEAFAF2D}" type="datetimeFigureOut">
               <a:rPr lang="en-GB" smtClean="0"/>
-              <a:t>06/12/2017</a:t>
+              <a:t>10/01/2018</a:t>
             </a:fld>
             <a:endParaRPr lang="en-GB"/>
           </a:p>
@@ -2174,7 +2174,7 @@
           <a:p>
             <a:fld id="{A79B0C5A-868C-EC4F-B227-B0E7EEAFAF2D}" type="datetimeFigureOut">
               <a:rPr lang="en-GB" smtClean="0"/>
-              <a:t>06/12/2017</a:t>
+              <a:t>10/01/2018</a:t>
             </a:fld>
             <a:endParaRPr lang="en-GB"/>
           </a:p>
@@ -2451,7 +2451,7 @@
           <a:p>
             <a:fld id="{A79B0C5A-868C-EC4F-B227-B0E7EEAFAF2D}" type="datetimeFigureOut">
               <a:rPr lang="en-GB" smtClean="0"/>
-              <a:t>06/12/2017</a:t>
+              <a:t>10/01/2018</a:t>
             </a:fld>
             <a:endParaRPr lang="en-GB"/>
           </a:p>
@@ -2704,7 +2704,7 @@
           <a:p>
             <a:fld id="{A79B0C5A-868C-EC4F-B227-B0E7EEAFAF2D}" type="datetimeFigureOut">
               <a:rPr lang="en-GB" smtClean="0"/>
-              <a:t>06/12/2017</a:t>
+              <a:t>10/01/2018</a:t>
             </a:fld>
             <a:endParaRPr lang="en-GB"/>
           </a:p>
@@ -2917,7 +2917,7 @@
           <a:p>
             <a:fld id="{A79B0C5A-868C-EC4F-B227-B0E7EEAFAF2D}" type="datetimeFigureOut">
               <a:rPr lang="en-GB" smtClean="0"/>
-              <a:t>06/12/2017</a:t>
+              <a:t>10/01/2018</a:t>
             </a:fld>
             <a:endParaRPr lang="en-GB"/>
           </a:p>
@@ -3324,7 +3324,7 @@
       </p:grpSpPr>
       <p:grpSp>
         <p:nvGrpSpPr>
-          <p:cNvPr id="162" name="Group 161"/>
+          <p:cNvPr id="45" name="Group 44"/>
           <p:cNvGrpSpPr/>
           <p:nvPr/>
         </p:nvGrpSpPr>
@@ -3332,1348 +3332,20 @@
           <a:xfrm>
             <a:off x="630325" y="3831271"/>
             <a:ext cx="11409938" cy="1984881"/>
-            <a:chOff x="524190" y="492078"/>
+            <a:chOff x="822573" y="578706"/>
             <a:chExt cx="11409938" cy="1984881"/>
           </a:xfrm>
         </p:grpSpPr>
-        <p:grpSp>
-          <p:nvGrpSpPr>
-            <p:cNvPr id="45" name="Group 44"/>
-            <p:cNvGrpSpPr/>
-            <p:nvPr/>
-          </p:nvGrpSpPr>
-          <p:grpSpPr>
-            <a:xfrm>
-              <a:off x="524190" y="492078"/>
-              <a:ext cx="11409938" cy="1984881"/>
-              <a:chOff x="822573" y="578706"/>
-              <a:chExt cx="11409938" cy="1984881"/>
-            </a:xfrm>
-          </p:grpSpPr>
-          <p:cxnSp>
-            <p:nvCxnSpPr>
-              <p:cNvPr id="38" name="Straight Arrow Connector 37"/>
-              <p:cNvCxnSpPr/>
-              <p:nvPr/>
-            </p:nvCxnSpPr>
-            <p:spPr>
-              <a:xfrm>
-                <a:off x="9923820" y="1604239"/>
-                <a:ext cx="1062453" cy="0"/>
-              </a:xfrm>
-              <a:prstGeom prst="straightConnector1">
-                <a:avLst/>
-              </a:prstGeom>
-              <a:solidFill>
-                <a:srgbClr val="C00000"/>
-              </a:solidFill>
-              <a:ln w="50800">
-                <a:solidFill>
-                  <a:srgbClr val="C00000"/>
-                </a:solidFill>
-                <a:tailEnd type="triangle"/>
-              </a:ln>
-            </p:spPr>
-            <p:style>
-              <a:lnRef idx="1">
-                <a:schemeClr val="accent1"/>
-              </a:lnRef>
-              <a:fillRef idx="0">
-                <a:schemeClr val="accent1"/>
-              </a:fillRef>
-              <a:effectRef idx="0">
-                <a:schemeClr val="accent1"/>
-              </a:effectRef>
-              <a:fontRef idx="minor">
-                <a:schemeClr val="tx1"/>
-              </a:fontRef>
-            </p:style>
-          </p:cxnSp>
-          <p:cxnSp>
-            <p:nvCxnSpPr>
-              <p:cNvPr id="39" name="Straight Arrow Connector 38"/>
-              <p:cNvCxnSpPr/>
-              <p:nvPr/>
-            </p:nvCxnSpPr>
-            <p:spPr>
-              <a:xfrm flipV="1">
-                <a:off x="11475730" y="769557"/>
-                <a:ext cx="0" cy="345808"/>
-              </a:xfrm>
-              <a:prstGeom prst="straightConnector1">
-                <a:avLst/>
-              </a:prstGeom>
-              <a:solidFill>
-                <a:srgbClr val="C00000"/>
-              </a:solidFill>
-              <a:ln w="50800">
-                <a:solidFill>
-                  <a:srgbClr val="C00000"/>
-                </a:solidFill>
-                <a:tailEnd type="triangle"/>
-              </a:ln>
-            </p:spPr>
-            <p:style>
-              <a:lnRef idx="1">
-                <a:schemeClr val="accent1"/>
-              </a:lnRef>
-              <a:fillRef idx="0">
-                <a:schemeClr val="accent1"/>
-              </a:fillRef>
-              <a:effectRef idx="0">
-                <a:schemeClr val="accent1"/>
-              </a:effectRef>
-              <a:fontRef idx="minor">
-                <a:schemeClr val="tx1"/>
-              </a:fontRef>
-            </p:style>
-          </p:cxnSp>
-          <p:grpSp>
-            <p:nvGrpSpPr>
-              <p:cNvPr id="44" name="Group 43"/>
-              <p:cNvGrpSpPr/>
-              <p:nvPr/>
-            </p:nvGrpSpPr>
-            <p:grpSpPr>
-              <a:xfrm>
-                <a:off x="822573" y="578706"/>
-                <a:ext cx="11409938" cy="1984881"/>
-                <a:chOff x="822573" y="578706"/>
-                <a:chExt cx="11409938" cy="1984881"/>
-              </a:xfrm>
-            </p:grpSpPr>
-            <p:grpSp>
-              <p:nvGrpSpPr>
-                <p:cNvPr id="11" name="Group 10"/>
-                <p:cNvGrpSpPr/>
-                <p:nvPr/>
-              </p:nvGrpSpPr>
-              <p:grpSpPr>
-                <a:xfrm>
-                  <a:off x="822573" y="578706"/>
-                  <a:ext cx="9341963" cy="1984881"/>
-                  <a:chOff x="781751" y="2007455"/>
-                  <a:chExt cx="11229245" cy="2401826"/>
-                </a:xfrm>
-              </p:grpSpPr>
-              <p:grpSp>
-                <p:nvGrpSpPr>
-                  <p:cNvPr id="9" name="Group 8"/>
-                  <p:cNvGrpSpPr/>
-                  <p:nvPr/>
-                </p:nvGrpSpPr>
-                <p:grpSpPr>
-                  <a:xfrm>
-                    <a:off x="781751" y="2007455"/>
-                    <a:ext cx="11229245" cy="2401826"/>
-                    <a:chOff x="781751" y="2007455"/>
-                    <a:chExt cx="11229245" cy="2401826"/>
-                  </a:xfrm>
-                </p:grpSpPr>
-                <p:sp>
-                  <p:nvSpPr>
-                    <p:cNvPr id="28" name="TextBox 27"/>
-                    <p:cNvSpPr txBox="1"/>
-                    <p:nvPr/>
-                  </p:nvSpPr>
-                  <p:spPr>
-                    <a:xfrm>
-                      <a:off x="11115812" y="2034285"/>
-                      <a:ext cx="895184" cy="369332"/>
-                    </a:xfrm>
-                    <a:prstGeom prst="rect">
-                      <a:avLst/>
-                    </a:prstGeom>
-                    <a:noFill/>
-                  </p:spPr>
-                  <p:txBody>
-                    <a:bodyPr wrap="square" rtlCol="0">
-                      <a:spAutoFit/>
-                    </a:bodyPr>
-                    <a:lstStyle/>
-                    <a:p>
-                      <a:r>
-                        <a:rPr lang="en-GB" sz="1400" dirty="0" smtClean="0"/>
-                        <a:t>Deaths</a:t>
-                      </a:r>
-                      <a:endParaRPr lang="en-GB" sz="1400" dirty="0"/>
-                    </a:p>
-                  </p:txBody>
-                </p:sp>
-                <p:grpSp>
-                  <p:nvGrpSpPr>
-                    <p:cNvPr id="7" name="Group 6"/>
-                    <p:cNvGrpSpPr>
-                      <a:grpSpLocks noChangeAspect="1"/>
-                    </p:cNvGrpSpPr>
-                    <p:nvPr/>
-                  </p:nvGrpSpPr>
-                  <p:grpSpPr>
-                    <a:xfrm>
-                      <a:off x="781751" y="2007455"/>
-                      <a:ext cx="10939899" cy="2401826"/>
-                      <a:chOff x="781751" y="2007455"/>
-                      <a:chExt cx="10939899" cy="2401826"/>
-                    </a:xfrm>
-                  </p:grpSpPr>
-                  <p:grpSp>
-                    <p:nvGrpSpPr>
-                      <p:cNvPr id="36" name="Group 35"/>
-                      <p:cNvGrpSpPr>
-                        <a:grpSpLocks noChangeAspect="1"/>
-                      </p:cNvGrpSpPr>
-                      <p:nvPr/>
-                    </p:nvGrpSpPr>
-                    <p:grpSpPr>
-                      <a:xfrm>
-                        <a:off x="781751" y="2007455"/>
-                        <a:ext cx="8786793" cy="2401826"/>
-                        <a:chOff x="595994" y="1497565"/>
-                        <a:chExt cx="10857572" cy="2923272"/>
-                      </a:xfrm>
-                    </p:grpSpPr>
-                    <p:grpSp>
-                      <p:nvGrpSpPr>
-                        <p:cNvPr id="23" name="Group 22"/>
-                        <p:cNvGrpSpPr/>
-                        <p:nvPr/>
-                      </p:nvGrpSpPr>
-                      <p:grpSpPr>
-                        <a:xfrm>
-                          <a:off x="595994" y="1778645"/>
-                          <a:ext cx="10494191" cy="1952797"/>
-                          <a:chOff x="595994" y="1778645"/>
-                          <a:chExt cx="10494191" cy="1952797"/>
-                        </a:xfrm>
-                      </p:grpSpPr>
-                      <p:grpSp>
-                        <p:nvGrpSpPr>
-                          <p:cNvPr id="14" name="Group 13"/>
-                          <p:cNvGrpSpPr/>
-                          <p:nvPr/>
-                        </p:nvGrpSpPr>
-                        <p:grpSpPr>
-                          <a:xfrm>
-                            <a:off x="595994" y="2291442"/>
-                            <a:ext cx="10494191" cy="1440000"/>
-                            <a:chOff x="595994" y="2291442"/>
-                            <a:chExt cx="10494191" cy="1440000"/>
-                          </a:xfrm>
-                        </p:grpSpPr>
-                        <p:grpSp>
-                          <p:nvGrpSpPr>
-                            <p:cNvPr id="6" name="Group 5"/>
-                            <p:cNvGrpSpPr/>
-                            <p:nvPr/>
-                          </p:nvGrpSpPr>
-                          <p:grpSpPr>
-                            <a:xfrm>
-                              <a:off x="595994" y="2291442"/>
-                              <a:ext cx="10494191" cy="1440000"/>
-                              <a:chOff x="595994" y="2291442"/>
-                              <a:chExt cx="10494191" cy="1440000"/>
-                            </a:xfrm>
-                          </p:grpSpPr>
-                          <p:sp>
-                            <p:nvSpPr>
-                              <p:cNvPr id="2" name="Rounded Rectangle 1"/>
-                              <p:cNvSpPr/>
-                              <p:nvPr/>
-                            </p:nvSpPr>
-                            <p:spPr>
-                              <a:xfrm>
-                                <a:off x="595994" y="2291442"/>
-                                <a:ext cx="1440000" cy="1440000"/>
-                              </a:xfrm>
-                              <a:prstGeom prst="roundRect">
-                                <a:avLst/>
-                              </a:prstGeom>
-                              <a:solidFill>
-                                <a:srgbClr val="C00000"/>
-                              </a:solidFill>
-                            </p:spPr>
-                            <p:style>
-                              <a:lnRef idx="2">
-                                <a:schemeClr val="accent1">
-                                  <a:shade val="50000"/>
-                                </a:schemeClr>
-                              </a:lnRef>
-                              <a:fillRef idx="1">
-                                <a:schemeClr val="accent1"/>
-                              </a:fillRef>
-                              <a:effectRef idx="0">
-                                <a:schemeClr val="accent1"/>
-                              </a:effectRef>
-                              <a:fontRef idx="minor">
-                                <a:schemeClr val="lt1"/>
-                              </a:fontRef>
-                            </p:style>
-                            <p:txBody>
-                              <a:bodyPr rtlCol="0" anchor="ctr"/>
-                              <a:lstStyle/>
-                              <a:p>
-                                <a:pPr algn="ctr"/>
-                                <a:r>
-                                  <a:rPr lang="en-GB" sz="4000" dirty="0" smtClean="0">
-                                    <a:solidFill>
-                                      <a:schemeClr val="bg1"/>
-                                    </a:solidFill>
-                                  </a:rPr>
-                                  <a:t>S</a:t>
-                                </a:r>
-                                <a:r>
-                                  <a:rPr lang="en-GB" sz="4000" baseline="-25000" dirty="0">
-                                    <a:solidFill>
-                                      <a:schemeClr val="bg1"/>
-                                    </a:solidFill>
-                                  </a:rPr>
-                                  <a:t>H</a:t>
-                                </a:r>
-                                <a:endParaRPr lang="en-GB" sz="4000" dirty="0">
-                                  <a:solidFill>
-                                    <a:schemeClr val="bg1"/>
-                                  </a:solidFill>
-                                </a:endParaRPr>
-                              </a:p>
-                            </p:txBody>
-                          </p:sp>
-                          <p:sp>
-                            <p:nvSpPr>
-                              <p:cNvPr id="3" name="Rounded Rectangle 2"/>
-                              <p:cNvSpPr/>
-                              <p:nvPr/>
-                            </p:nvSpPr>
-                            <p:spPr>
-                              <a:xfrm>
-                                <a:off x="6632122" y="2291442"/>
-                                <a:ext cx="1440000" cy="1440000"/>
-                              </a:xfrm>
-                              <a:prstGeom prst="roundRect">
-                                <a:avLst/>
-                              </a:prstGeom>
-                              <a:solidFill>
-                                <a:srgbClr val="C00000"/>
-                              </a:solidFill>
-                            </p:spPr>
-                            <p:style>
-                              <a:lnRef idx="2">
-                                <a:schemeClr val="accent1">
-                                  <a:shade val="50000"/>
-                                </a:schemeClr>
-                              </a:lnRef>
-                              <a:fillRef idx="1">
-                                <a:schemeClr val="accent1"/>
-                              </a:fillRef>
-                              <a:effectRef idx="0">
-                                <a:schemeClr val="accent1"/>
-                              </a:effectRef>
-                              <a:fontRef idx="minor">
-                                <a:schemeClr val="lt1"/>
-                              </a:fontRef>
-                            </p:style>
-                            <p:txBody>
-                              <a:bodyPr rtlCol="0" anchor="ctr"/>
-                              <a:lstStyle/>
-                              <a:p>
-                                <a:pPr algn="ctr"/>
-                                <a:r>
-                                  <a:rPr lang="en-GB" sz="4000" dirty="0" smtClean="0">
-                                    <a:solidFill>
-                                      <a:schemeClr val="bg1"/>
-                                    </a:solidFill>
-                                  </a:rPr>
-                                  <a:t>L</a:t>
-                                </a:r>
-                                <a:r>
-                                  <a:rPr lang="en-GB" sz="4000" baseline="-25000" dirty="0">
-                                    <a:solidFill>
-                                      <a:schemeClr val="bg1"/>
-                                    </a:solidFill>
-                                  </a:rPr>
-                                  <a:t>H</a:t>
-                                </a:r>
-                                <a:endParaRPr lang="en-GB" sz="4000" dirty="0">
-                                  <a:solidFill>
-                                    <a:schemeClr val="bg1"/>
-                                  </a:solidFill>
-                                </a:endParaRPr>
-                              </a:p>
-                            </p:txBody>
-                          </p:sp>
-                          <p:sp>
-                            <p:nvSpPr>
-                              <p:cNvPr id="4" name="Rounded Rectangle 3"/>
-                              <p:cNvSpPr/>
-                              <p:nvPr/>
-                            </p:nvSpPr>
-                            <p:spPr>
-                              <a:xfrm>
-                                <a:off x="3607257" y="2291442"/>
-                                <a:ext cx="1440000" cy="1440000"/>
-                              </a:xfrm>
-                              <a:prstGeom prst="roundRect">
-                                <a:avLst/>
-                              </a:prstGeom>
-                              <a:solidFill>
-                                <a:srgbClr val="C00000"/>
-                              </a:solidFill>
-                            </p:spPr>
-                            <p:style>
-                              <a:lnRef idx="2">
-                                <a:schemeClr val="accent1">
-                                  <a:shade val="50000"/>
-                                </a:schemeClr>
-                              </a:lnRef>
-                              <a:fillRef idx="1">
-                                <a:schemeClr val="accent1"/>
-                              </a:fillRef>
-                              <a:effectRef idx="0">
-                                <a:schemeClr val="accent1"/>
-                              </a:effectRef>
-                              <a:fontRef idx="minor">
-                                <a:schemeClr val="lt1"/>
-                              </a:fontRef>
-                            </p:style>
-                            <p:txBody>
-                              <a:bodyPr rtlCol="0" anchor="ctr"/>
-                              <a:lstStyle/>
-                              <a:p>
-                                <a:pPr algn="ctr"/>
-                                <a:r>
-                                  <a:rPr lang="en-GB" sz="4000" dirty="0" smtClean="0">
-                                    <a:solidFill>
-                                      <a:schemeClr val="bg1"/>
-                                    </a:solidFill>
-                                  </a:rPr>
-                                  <a:t>H</a:t>
-                                </a:r>
-                                <a:r>
-                                  <a:rPr lang="en-GB" sz="4000" baseline="-25000" dirty="0">
-                                    <a:solidFill>
-                                      <a:schemeClr val="bg1"/>
-                                    </a:solidFill>
-                                  </a:rPr>
-                                  <a:t>H</a:t>
-                                </a:r>
-                                <a:endParaRPr lang="en-GB" sz="4000" dirty="0">
-                                  <a:solidFill>
-                                    <a:schemeClr val="bg1"/>
-                                  </a:solidFill>
-                                </a:endParaRPr>
-                              </a:p>
-                            </p:txBody>
-                          </p:sp>
-                          <p:sp>
-                            <p:nvSpPr>
-                              <p:cNvPr id="5" name="Rounded Rectangle 4"/>
-                              <p:cNvSpPr/>
-                              <p:nvPr/>
-                            </p:nvSpPr>
-                            <p:spPr>
-                              <a:xfrm>
-                                <a:off x="9650185" y="2291442"/>
-                                <a:ext cx="1440000" cy="1440000"/>
-                              </a:xfrm>
-                              <a:prstGeom prst="roundRect">
-                                <a:avLst/>
-                              </a:prstGeom>
-                              <a:solidFill>
-                                <a:srgbClr val="C00000"/>
-                              </a:solidFill>
-                            </p:spPr>
-                            <p:style>
-                              <a:lnRef idx="2">
-                                <a:schemeClr val="accent1">
-                                  <a:shade val="50000"/>
-                                </a:schemeClr>
-                              </a:lnRef>
-                              <a:fillRef idx="1">
-                                <a:schemeClr val="accent1"/>
-                              </a:fillRef>
-                              <a:effectRef idx="0">
-                                <a:schemeClr val="accent1"/>
-                              </a:effectRef>
-                              <a:fontRef idx="minor">
-                                <a:schemeClr val="lt1"/>
-                              </a:fontRef>
-                            </p:style>
-                            <p:txBody>
-                              <a:bodyPr rtlCol="0" anchor="ctr"/>
-                              <a:lstStyle/>
-                              <a:p>
-                                <a:pPr algn="ctr"/>
-                                <a:r>
-                                  <a:rPr lang="en-GB" sz="4000" dirty="0" smtClean="0">
-                                    <a:solidFill>
-                                      <a:schemeClr val="bg1"/>
-                                    </a:solidFill>
-                                  </a:rPr>
-                                  <a:t>I</a:t>
-                                </a:r>
-                                <a:r>
-                                  <a:rPr lang="en-GB" sz="4000" baseline="-25000" dirty="0">
-                                    <a:solidFill>
-                                      <a:schemeClr val="bg1"/>
-                                    </a:solidFill>
-                                  </a:rPr>
-                                  <a:t>H</a:t>
-                                </a:r>
-                                <a:endParaRPr lang="en-GB" sz="4000" dirty="0">
-                                  <a:solidFill>
-                                    <a:schemeClr val="bg1"/>
-                                  </a:solidFill>
-                                </a:endParaRPr>
-                              </a:p>
-                            </p:txBody>
-                          </p:sp>
-                        </p:grpSp>
-                        <p:cxnSp>
-                          <p:nvCxnSpPr>
-                            <p:cNvPr id="8" name="Straight Arrow Connector 7"/>
-                            <p:cNvCxnSpPr>
-                              <a:stCxn id="2" idx="3"/>
-                              <a:endCxn id="4" idx="1"/>
-                            </p:cNvCxnSpPr>
-                            <p:nvPr/>
-                          </p:nvCxnSpPr>
-                          <p:spPr>
-                            <a:xfrm>
-                              <a:off x="2035994" y="3011442"/>
-                              <a:ext cx="1571263" cy="0"/>
-                            </a:xfrm>
-                            <a:prstGeom prst="straightConnector1">
-                              <a:avLst/>
-                            </a:prstGeom>
-                            <a:ln w="50800">
-                              <a:solidFill>
-                                <a:srgbClr val="C00000"/>
-                              </a:solidFill>
-                              <a:tailEnd type="triangle"/>
-                            </a:ln>
-                          </p:spPr>
-                          <p:style>
-                            <a:lnRef idx="1">
-                              <a:schemeClr val="accent1"/>
-                            </a:lnRef>
-                            <a:fillRef idx="0">
-                              <a:schemeClr val="accent1"/>
-                            </a:fillRef>
-                            <a:effectRef idx="0">
-                              <a:schemeClr val="accent1"/>
-                            </a:effectRef>
-                            <a:fontRef idx="minor">
-                              <a:schemeClr val="tx1"/>
-                            </a:fontRef>
-                          </p:style>
-                        </p:cxnSp>
-                        <p:cxnSp>
-                          <p:nvCxnSpPr>
-                            <p:cNvPr id="10" name="Straight Arrow Connector 9"/>
-                            <p:cNvCxnSpPr>
-                              <a:stCxn id="4" idx="3"/>
-                              <a:endCxn id="3" idx="1"/>
-                            </p:cNvCxnSpPr>
-                            <p:nvPr/>
-                          </p:nvCxnSpPr>
-                          <p:spPr>
-                            <a:xfrm>
-                              <a:off x="5047257" y="3011442"/>
-                              <a:ext cx="1584865" cy="0"/>
-                            </a:xfrm>
-                            <a:prstGeom prst="straightConnector1">
-                              <a:avLst/>
-                            </a:prstGeom>
-                            <a:solidFill>
-                              <a:srgbClr val="C00000"/>
-                            </a:solidFill>
-                            <a:ln w="50800">
-                              <a:solidFill>
-                                <a:srgbClr val="C00000"/>
-                              </a:solidFill>
-                              <a:tailEnd type="triangle"/>
-                            </a:ln>
-                          </p:spPr>
-                          <p:style>
-                            <a:lnRef idx="1">
-                              <a:schemeClr val="accent1"/>
-                            </a:lnRef>
-                            <a:fillRef idx="0">
-                              <a:schemeClr val="accent1"/>
-                            </a:fillRef>
-                            <a:effectRef idx="0">
-                              <a:schemeClr val="accent1"/>
-                            </a:effectRef>
-                            <a:fontRef idx="minor">
-                              <a:schemeClr val="tx1"/>
-                            </a:fontRef>
-                          </p:style>
-                        </p:cxnSp>
-                        <p:cxnSp>
-                          <p:nvCxnSpPr>
-                            <p:cNvPr id="12" name="Straight Arrow Connector 11"/>
-                            <p:cNvCxnSpPr>
-                              <a:stCxn id="3" idx="3"/>
-                              <a:endCxn id="5" idx="1"/>
-                            </p:cNvCxnSpPr>
-                            <p:nvPr/>
-                          </p:nvCxnSpPr>
-                          <p:spPr>
-                            <a:xfrm>
-                              <a:off x="8072122" y="3011442"/>
-                              <a:ext cx="1578064" cy="0"/>
-                            </a:xfrm>
-                            <a:prstGeom prst="straightConnector1">
-                              <a:avLst/>
-                            </a:prstGeom>
-                            <a:solidFill>
-                              <a:srgbClr val="C00000"/>
-                            </a:solidFill>
-                            <a:ln w="50800">
-                              <a:solidFill>
-                                <a:srgbClr val="C00000"/>
-                              </a:solidFill>
-                              <a:tailEnd type="triangle"/>
-                            </a:ln>
-                          </p:spPr>
-                          <p:style>
-                            <a:lnRef idx="1">
-                              <a:schemeClr val="accent1"/>
-                            </a:lnRef>
-                            <a:fillRef idx="0">
-                              <a:schemeClr val="accent1"/>
-                            </a:fillRef>
-                            <a:effectRef idx="0">
-                              <a:schemeClr val="accent1"/>
-                            </a:effectRef>
-                            <a:fontRef idx="minor">
-                              <a:schemeClr val="tx1"/>
-                            </a:fontRef>
-                          </p:style>
-                        </p:cxnSp>
-                      </p:grpSp>
-                      <p:cxnSp>
-                        <p:nvCxnSpPr>
-                          <p:cNvPr id="16" name="Straight Arrow Connector 15"/>
-                          <p:cNvCxnSpPr>
-                            <a:stCxn id="2" idx="0"/>
-                          </p:cNvCxnSpPr>
-                          <p:nvPr/>
-                        </p:nvCxnSpPr>
-                        <p:spPr>
-                          <a:xfrm flipV="1">
-                            <a:off x="1315994" y="1782147"/>
-                            <a:ext cx="0" cy="509295"/>
-                          </a:xfrm>
-                          <a:prstGeom prst="straightConnector1">
-                            <a:avLst/>
-                          </a:prstGeom>
-                          <a:ln w="50800">
-                            <a:solidFill>
-                              <a:srgbClr val="C00000"/>
-                            </a:solidFill>
-                            <a:tailEnd type="triangle"/>
-                          </a:ln>
-                        </p:spPr>
-                        <p:style>
-                          <a:lnRef idx="1">
-                            <a:schemeClr val="accent1"/>
-                          </a:lnRef>
-                          <a:fillRef idx="0">
-                            <a:schemeClr val="accent1"/>
-                          </a:fillRef>
-                          <a:effectRef idx="0">
-                            <a:schemeClr val="accent1"/>
-                          </a:effectRef>
-                          <a:fontRef idx="minor">
-                            <a:schemeClr val="tx1"/>
-                          </a:fontRef>
-                        </p:style>
-                      </p:cxnSp>
-                      <p:cxnSp>
-                        <p:nvCxnSpPr>
-                          <p:cNvPr id="20" name="Straight Arrow Connector 19"/>
-                          <p:cNvCxnSpPr>
-                            <a:stCxn id="20" idx="0"/>
-                          </p:cNvCxnSpPr>
-                          <p:nvPr/>
-                        </p:nvCxnSpPr>
-                        <p:spPr>
-                          <a:xfrm flipV="1">
-                            <a:off x="4328215" y="1782146"/>
-                            <a:ext cx="0" cy="509295"/>
-                          </a:xfrm>
-                          <a:prstGeom prst="straightConnector1">
-                            <a:avLst/>
-                          </a:prstGeom>
-                          <a:ln w="50800">
-                            <a:solidFill>
-                              <a:srgbClr val="C00000"/>
-                            </a:solidFill>
-                            <a:tailEnd type="triangle"/>
-                          </a:ln>
-                        </p:spPr>
-                        <p:style>
-                          <a:lnRef idx="1">
-                            <a:schemeClr val="accent1"/>
-                          </a:lnRef>
-                          <a:fillRef idx="0">
-                            <a:schemeClr val="accent1"/>
-                          </a:fillRef>
-                          <a:effectRef idx="0">
-                            <a:schemeClr val="accent1"/>
-                          </a:effectRef>
-                          <a:fontRef idx="minor">
-                            <a:schemeClr val="tx1"/>
-                          </a:fontRef>
-                        </p:style>
-                      </p:cxnSp>
-                      <p:cxnSp>
-                        <p:nvCxnSpPr>
-                          <p:cNvPr id="21" name="Straight Arrow Connector 20"/>
-                          <p:cNvCxnSpPr>
-                            <a:stCxn id="21" idx="0"/>
-                          </p:cNvCxnSpPr>
-                          <p:nvPr/>
-                        </p:nvCxnSpPr>
-                        <p:spPr>
-                          <a:xfrm flipV="1">
-                            <a:off x="7352122" y="1778646"/>
-                            <a:ext cx="0" cy="509295"/>
-                          </a:xfrm>
-                          <a:prstGeom prst="straightConnector1">
-                            <a:avLst/>
-                          </a:prstGeom>
-                          <a:ln w="50800">
-                            <a:solidFill>
-                              <a:srgbClr val="C00000"/>
-                            </a:solidFill>
-                            <a:tailEnd type="triangle"/>
-                          </a:ln>
-                        </p:spPr>
-                        <p:style>
-                          <a:lnRef idx="1">
-                            <a:schemeClr val="accent1"/>
-                          </a:lnRef>
-                          <a:fillRef idx="0">
-                            <a:schemeClr val="accent1"/>
-                          </a:fillRef>
-                          <a:effectRef idx="0">
-                            <a:schemeClr val="accent1"/>
-                          </a:effectRef>
-                          <a:fontRef idx="minor">
-                            <a:schemeClr val="tx1"/>
-                          </a:fontRef>
-                        </p:style>
-                      </p:cxnSp>
-                      <p:cxnSp>
-                        <p:nvCxnSpPr>
-                          <p:cNvPr id="22" name="Straight Arrow Connector 21"/>
-                          <p:cNvCxnSpPr>
-                            <a:stCxn id="22" idx="0"/>
-                          </p:cNvCxnSpPr>
-                          <p:nvPr/>
-                        </p:nvCxnSpPr>
-                        <p:spPr>
-                          <a:xfrm flipV="1">
-                            <a:off x="10370186" y="1778645"/>
-                            <a:ext cx="0" cy="509295"/>
-                          </a:xfrm>
-                          <a:prstGeom prst="straightConnector1">
-                            <a:avLst/>
-                          </a:prstGeom>
-                          <a:ln w="50800">
-                            <a:solidFill>
-                              <a:srgbClr val="C00000"/>
-                            </a:solidFill>
-                            <a:tailEnd type="triangle"/>
-                          </a:ln>
-                        </p:spPr>
-                        <p:style>
-                          <a:lnRef idx="1">
-                            <a:schemeClr val="accent1"/>
-                          </a:lnRef>
-                          <a:fillRef idx="0">
-                            <a:schemeClr val="accent1"/>
-                          </a:fillRef>
-                          <a:effectRef idx="0">
-                            <a:schemeClr val="accent1"/>
-                          </a:effectRef>
-                          <a:fontRef idx="minor">
-                            <a:schemeClr val="tx1"/>
-                          </a:fontRef>
-                        </p:style>
-                      </p:cxnSp>
-                    </p:grpSp>
-                    <p:cxnSp>
-                      <p:nvCxnSpPr>
-                        <p:cNvPr id="25" name="Straight Arrow Connector 24"/>
-                        <p:cNvCxnSpPr>
-                          <a:endCxn id="2" idx="2"/>
-                        </p:cNvCxnSpPr>
-                        <p:nvPr/>
-                      </p:nvCxnSpPr>
-                      <p:spPr>
-                        <a:xfrm flipV="1">
-                          <a:off x="1315994" y="3731442"/>
-                          <a:ext cx="0" cy="509295"/>
-                        </a:xfrm>
-                        <a:prstGeom prst="straightConnector1">
-                          <a:avLst/>
-                        </a:prstGeom>
-                        <a:ln w="50800">
-                          <a:solidFill>
-                            <a:srgbClr val="C00000"/>
-                          </a:solidFill>
-                          <a:tailEnd type="triangle"/>
-                        </a:ln>
-                      </p:spPr>
-                      <p:style>
-                        <a:lnRef idx="1">
-                          <a:schemeClr val="accent1"/>
-                        </a:lnRef>
-                        <a:fillRef idx="0">
-                          <a:schemeClr val="accent1"/>
-                        </a:fillRef>
-                        <a:effectRef idx="0">
-                          <a:schemeClr val="accent1"/>
-                        </a:effectRef>
-                        <a:fontRef idx="minor">
-                          <a:schemeClr val="tx1"/>
-                        </a:fontRef>
-                      </p:style>
-                    </p:cxnSp>
-                    <p:sp>
-                      <p:nvSpPr>
-                        <p:cNvPr id="31" name="TextBox 30"/>
-                        <p:cNvSpPr txBox="1"/>
-                        <p:nvPr/>
-                      </p:nvSpPr>
-                      <p:spPr>
-                        <a:xfrm>
-                          <a:off x="1390450" y="1497565"/>
-                          <a:ext cx="1245889" cy="449515"/>
-                        </a:xfrm>
-                        <a:prstGeom prst="rect">
-                          <a:avLst/>
-                        </a:prstGeom>
-                        <a:noFill/>
-                      </p:spPr>
-                      <p:txBody>
-                        <a:bodyPr wrap="square" rtlCol="0">
-                          <a:spAutoFit/>
-                        </a:bodyPr>
-                        <a:lstStyle/>
-                        <a:p>
-                          <a:r>
-                            <a:rPr lang="en-GB" sz="1400" dirty="0" smtClean="0"/>
-                            <a:t>Deaths</a:t>
-                          </a:r>
-                          <a:endParaRPr lang="en-GB" sz="1400" dirty="0"/>
-                        </a:p>
-                      </p:txBody>
-                    </p:sp>
-                    <p:sp>
-                      <p:nvSpPr>
-                        <p:cNvPr id="32" name="TextBox 31"/>
-                        <p:cNvSpPr txBox="1"/>
-                        <p:nvPr/>
-                      </p:nvSpPr>
-                      <p:spPr>
-                        <a:xfrm>
-                          <a:off x="4408514" y="1530220"/>
-                          <a:ext cx="1103008" cy="449515"/>
-                        </a:xfrm>
-                        <a:prstGeom prst="rect">
-                          <a:avLst/>
-                        </a:prstGeom>
-                        <a:noFill/>
-                      </p:spPr>
-                      <p:txBody>
-                        <a:bodyPr wrap="square" rtlCol="0">
-                          <a:spAutoFit/>
-                        </a:bodyPr>
-                        <a:lstStyle/>
-                        <a:p>
-                          <a:r>
-                            <a:rPr lang="en-GB" sz="1400" dirty="0" smtClean="0"/>
-                            <a:t>Deaths</a:t>
-                          </a:r>
-                          <a:endParaRPr lang="en-GB" sz="1400" dirty="0"/>
-                        </a:p>
-                      </p:txBody>
-                    </p:sp>
-                    <p:sp>
-                      <p:nvSpPr>
-                        <p:cNvPr id="33" name="TextBox 32"/>
-                        <p:cNvSpPr txBox="1"/>
-                        <p:nvPr/>
-                      </p:nvSpPr>
-                      <p:spPr>
-                        <a:xfrm>
-                          <a:off x="7377947" y="1497565"/>
-                          <a:ext cx="1128864" cy="449515"/>
-                        </a:xfrm>
-                        <a:prstGeom prst="rect">
-                          <a:avLst/>
-                        </a:prstGeom>
-                        <a:noFill/>
-                      </p:spPr>
-                      <p:txBody>
-                        <a:bodyPr wrap="square" rtlCol="0">
-                          <a:spAutoFit/>
-                        </a:bodyPr>
-                        <a:lstStyle/>
-                        <a:p>
-                          <a:r>
-                            <a:rPr lang="en-GB" sz="1400" dirty="0" smtClean="0"/>
-                            <a:t>Deaths</a:t>
-                          </a:r>
-                          <a:endParaRPr lang="en-GB" sz="1400" dirty="0"/>
-                        </a:p>
-                      </p:txBody>
-                    </p:sp>
-                    <p:sp>
-                      <p:nvSpPr>
-                        <p:cNvPr id="34" name="TextBox 33"/>
-                        <p:cNvSpPr txBox="1"/>
-                        <p:nvPr/>
-                      </p:nvSpPr>
-                      <p:spPr>
-                        <a:xfrm>
-                          <a:off x="10347414" y="1530220"/>
-                          <a:ext cx="1106152" cy="449515"/>
-                        </a:xfrm>
-                        <a:prstGeom prst="rect">
-                          <a:avLst/>
-                        </a:prstGeom>
-                        <a:noFill/>
-                      </p:spPr>
-                      <p:txBody>
-                        <a:bodyPr wrap="square" rtlCol="0">
-                          <a:spAutoFit/>
-                        </a:bodyPr>
-                        <a:lstStyle/>
-                        <a:p>
-                          <a:r>
-                            <a:rPr lang="en-GB" sz="1400" dirty="0" smtClean="0"/>
-                            <a:t>Deaths</a:t>
-                          </a:r>
-                          <a:endParaRPr lang="en-GB" sz="1400" dirty="0"/>
-                        </a:p>
-                      </p:txBody>
-                    </p:sp>
-                    <p:sp>
-                      <p:nvSpPr>
-                        <p:cNvPr id="35" name="TextBox 34"/>
-                        <p:cNvSpPr txBox="1"/>
-                        <p:nvPr/>
-                      </p:nvSpPr>
-                      <p:spPr>
-                        <a:xfrm>
-                          <a:off x="1390450" y="3971322"/>
-                          <a:ext cx="953326" cy="449515"/>
-                        </a:xfrm>
-                        <a:prstGeom prst="rect">
-                          <a:avLst/>
-                        </a:prstGeom>
-                        <a:noFill/>
-                      </p:spPr>
-                      <p:txBody>
-                        <a:bodyPr wrap="square" rtlCol="0">
-                          <a:spAutoFit/>
-                        </a:bodyPr>
-                        <a:lstStyle/>
-                        <a:p>
-                          <a:r>
-                            <a:rPr lang="en-GB" sz="1400" dirty="0" smtClean="0"/>
-                            <a:t>Births</a:t>
-                          </a:r>
-                          <a:endParaRPr lang="en-GB" sz="1400" dirty="0"/>
-                        </a:p>
-                      </p:txBody>
-                    </p:sp>
-                  </p:grpSp>
-                  <p:sp>
-                    <p:nvSpPr>
-                      <p:cNvPr id="24" name="Rounded Rectangle 23"/>
-                      <p:cNvSpPr/>
-                      <p:nvPr/>
-                    </p:nvSpPr>
-                    <p:spPr>
-                      <a:xfrm>
-                        <a:off x="10556290" y="2656845"/>
-                        <a:ext cx="1165360" cy="1183136"/>
-                      </a:xfrm>
-                      <a:prstGeom prst="roundRect">
-                        <a:avLst/>
-                      </a:prstGeom>
-                      <a:solidFill>
-                        <a:srgbClr val="C00000"/>
-                      </a:solidFill>
-                    </p:spPr>
-                    <p:style>
-                      <a:lnRef idx="2">
-                        <a:schemeClr val="accent1">
-                          <a:shade val="50000"/>
-                        </a:schemeClr>
-                      </a:lnRef>
-                      <a:fillRef idx="1">
-                        <a:schemeClr val="accent1"/>
-                      </a:fillRef>
-                      <a:effectRef idx="0">
-                        <a:schemeClr val="accent1"/>
-                      </a:effectRef>
-                      <a:fontRef idx="minor">
-                        <a:schemeClr val="lt1"/>
-                      </a:fontRef>
-                    </p:style>
-                    <p:txBody>
-                      <a:bodyPr rtlCol="0" anchor="ctr"/>
-                      <a:lstStyle/>
-                      <a:p>
-                        <a:pPr algn="ctr"/>
-                        <a:r>
-                          <a:rPr lang="en-GB" sz="4000" dirty="0" smtClean="0">
-                            <a:solidFill>
-                              <a:schemeClr val="bg1"/>
-                            </a:solidFill>
-                          </a:rPr>
-                          <a:t>T</a:t>
-                        </a:r>
-                        <a:r>
-                          <a:rPr lang="en-GB" sz="4000" baseline="-25000" dirty="0">
-                            <a:solidFill>
-                              <a:schemeClr val="bg1"/>
-                            </a:solidFill>
-                          </a:rPr>
-                          <a:t>H</a:t>
-                        </a:r>
-                        <a:endParaRPr lang="en-GB" sz="4000" dirty="0">
-                          <a:solidFill>
-                            <a:schemeClr val="bg1"/>
-                          </a:solidFill>
-                        </a:endParaRPr>
-                      </a:p>
-                    </p:txBody>
-                  </p:sp>
-                  <p:cxnSp>
-                    <p:nvCxnSpPr>
-                      <p:cNvPr id="26" name="Straight Arrow Connector 25"/>
-                      <p:cNvCxnSpPr/>
-                      <p:nvPr/>
-                    </p:nvCxnSpPr>
-                    <p:spPr>
-                      <a:xfrm>
-                        <a:off x="9274469" y="3251291"/>
-                        <a:ext cx="1277092" cy="0"/>
-                      </a:xfrm>
-                      <a:prstGeom prst="straightConnector1">
-                        <a:avLst/>
-                      </a:prstGeom>
-                      <a:solidFill>
-                        <a:srgbClr val="C00000"/>
-                      </a:solidFill>
-                      <a:ln w="50800">
-                        <a:solidFill>
-                          <a:srgbClr val="C00000"/>
-                        </a:solidFill>
-                        <a:tailEnd type="triangle"/>
-                      </a:ln>
-                    </p:spPr>
-                    <p:style>
-                      <a:lnRef idx="1">
-                        <a:schemeClr val="accent1"/>
-                      </a:lnRef>
-                      <a:fillRef idx="0">
-                        <a:schemeClr val="accent1"/>
-                      </a:fillRef>
-                      <a:effectRef idx="0">
-                        <a:schemeClr val="accent1"/>
-                      </a:effectRef>
-                      <a:fontRef idx="minor">
-                        <a:schemeClr val="tx1"/>
-                      </a:fontRef>
-                    </p:style>
-                  </p:cxnSp>
-                  <p:cxnSp>
-                    <p:nvCxnSpPr>
-                      <p:cNvPr id="27" name="Straight Arrow Connector 26"/>
-                      <p:cNvCxnSpPr/>
-                      <p:nvPr/>
-                    </p:nvCxnSpPr>
-                    <p:spPr>
-                      <a:xfrm flipV="1">
-                        <a:off x="11138970" y="2238397"/>
-                        <a:ext cx="0" cy="418448"/>
-                      </a:xfrm>
-                      <a:prstGeom prst="straightConnector1">
-                        <a:avLst/>
-                      </a:prstGeom>
-                      <a:solidFill>
-                        <a:srgbClr val="C00000"/>
-                      </a:solidFill>
-                      <a:ln w="50800">
-                        <a:solidFill>
-                          <a:srgbClr val="C00000"/>
-                        </a:solidFill>
-                        <a:tailEnd type="triangle"/>
-                      </a:ln>
-                    </p:spPr>
-                    <p:style>
-                      <a:lnRef idx="1">
-                        <a:schemeClr val="accent1"/>
-                      </a:lnRef>
-                      <a:fillRef idx="0">
-                        <a:schemeClr val="accent1"/>
-                      </a:fillRef>
-                      <a:effectRef idx="0">
-                        <a:schemeClr val="accent1"/>
-                      </a:effectRef>
-                      <a:fontRef idx="minor">
-                        <a:schemeClr val="tx1"/>
-                      </a:fontRef>
-                    </p:style>
-                  </p:cxnSp>
-                  <p:cxnSp>
-                    <p:nvCxnSpPr>
-                      <p:cNvPr id="29" name="Straight Arrow Connector 28"/>
-                      <p:cNvCxnSpPr>
-                        <a:stCxn id="4" idx="2"/>
-                        <a:endCxn id="5" idx="2"/>
-                      </p:cNvCxnSpPr>
-                      <p:nvPr/>
-                    </p:nvCxnSpPr>
-                    <p:spPr>
-                      <a:xfrm rot="16200000" flipH="1">
-                        <a:off x="6246584" y="1397654"/>
-                        <a:ext cx="12700" cy="4890409"/>
-                      </a:xfrm>
-                      <a:prstGeom prst="curvedConnector3">
-                        <a:avLst>
-                          <a:gd name="adj1" fmla="val 6271575"/>
-                        </a:avLst>
-                      </a:prstGeom>
-                      <a:solidFill>
-                        <a:srgbClr val="C00000"/>
-                      </a:solidFill>
-                      <a:ln w="50800">
-                        <a:solidFill>
-                          <a:srgbClr val="C00000"/>
-                        </a:solidFill>
-                        <a:tailEnd type="triangle"/>
-                      </a:ln>
-                    </p:spPr>
-                    <p:style>
-                      <a:lnRef idx="1">
-                        <a:schemeClr val="accent1"/>
-                      </a:lnRef>
-                      <a:fillRef idx="0">
-                        <a:schemeClr val="accent1"/>
-                      </a:fillRef>
-                      <a:effectRef idx="0">
-                        <a:schemeClr val="accent1"/>
-                      </a:effectRef>
-                      <a:fontRef idx="minor">
-                        <a:schemeClr val="tx1"/>
-                      </a:fontRef>
-                    </p:style>
-                  </p:cxnSp>
-                </p:grpSp>
-              </p:grpSp>
-              <p:cxnSp>
-                <p:nvCxnSpPr>
-                  <p:cNvPr id="30" name="Straight Arrow Connector 29"/>
-                  <p:cNvCxnSpPr>
-                    <a:stCxn id="3" idx="2"/>
-                    <a:endCxn id="4" idx="2"/>
-                  </p:cNvCxnSpPr>
-                  <p:nvPr/>
-                </p:nvCxnSpPr>
-                <p:spPr>
-                  <a:xfrm rot="5400000">
-                    <a:off x="5025358" y="2618881"/>
-                    <a:ext cx="12700" cy="2447956"/>
-                  </a:xfrm>
-                  <a:prstGeom prst="curvedConnector3">
-                    <a:avLst>
-                      <a:gd name="adj1" fmla="val 2103157"/>
-                    </a:avLst>
-                  </a:prstGeom>
-                  <a:solidFill>
-                    <a:srgbClr val="C00000"/>
-                  </a:solidFill>
-                  <a:ln w="50800">
-                    <a:solidFill>
-                      <a:srgbClr val="C00000"/>
-                    </a:solidFill>
-                    <a:tailEnd type="triangle"/>
-                  </a:ln>
-                </p:spPr>
-                <p:style>
-                  <a:lnRef idx="1">
-                    <a:schemeClr val="accent1"/>
-                  </a:lnRef>
-                  <a:fillRef idx="0">
-                    <a:schemeClr val="accent1"/>
-                  </a:fillRef>
-                  <a:effectRef idx="0">
-                    <a:schemeClr val="accent1"/>
-                  </a:effectRef>
-                  <a:fontRef idx="minor">
-                    <a:schemeClr val="tx1"/>
-                  </a:fontRef>
-                </p:style>
-              </p:cxnSp>
-            </p:grpSp>
-            <p:sp>
-              <p:nvSpPr>
-                <p:cNvPr id="37" name="Rounded Rectangle 36"/>
-                <p:cNvSpPr/>
-                <p:nvPr/>
-              </p:nvSpPr>
-              <p:spPr>
-                <a:xfrm>
-                  <a:off x="10986272" y="1112495"/>
-                  <a:ext cx="969500" cy="977749"/>
-                </a:xfrm>
-                <a:prstGeom prst="roundRect">
-                  <a:avLst/>
-                </a:prstGeom>
-                <a:solidFill>
-                  <a:srgbClr val="C00000"/>
-                </a:solidFill>
-              </p:spPr>
-              <p:style>
-                <a:lnRef idx="2">
-                  <a:schemeClr val="accent1">
-                    <a:shade val="50000"/>
-                  </a:schemeClr>
-                </a:lnRef>
-                <a:fillRef idx="1">
-                  <a:schemeClr val="accent1"/>
-                </a:fillRef>
-                <a:effectRef idx="0">
-                  <a:schemeClr val="accent1"/>
-                </a:effectRef>
-                <a:fontRef idx="minor">
-                  <a:schemeClr val="lt1"/>
-                </a:fontRef>
-              </p:style>
-              <p:txBody>
-                <a:bodyPr rtlCol="0" anchor="ctr"/>
-                <a:lstStyle/>
-                <a:p>
-                  <a:pPr algn="ctr"/>
-                  <a:r>
-                    <a:rPr lang="en-GB" sz="4000" dirty="0" smtClean="0">
-                      <a:solidFill>
-                        <a:schemeClr val="bg1"/>
-                      </a:solidFill>
-                    </a:rPr>
-                    <a:t>R</a:t>
-                  </a:r>
-                  <a:r>
-                    <a:rPr lang="en-GB" sz="4000" baseline="-25000" dirty="0">
-                      <a:solidFill>
-                        <a:schemeClr val="bg1"/>
-                      </a:solidFill>
-                    </a:rPr>
-                    <a:t>H</a:t>
-                  </a:r>
-                  <a:endParaRPr lang="en-GB" sz="4000" dirty="0">
-                    <a:solidFill>
-                      <a:schemeClr val="bg1"/>
-                    </a:solidFill>
-                  </a:endParaRPr>
-                </a:p>
-              </p:txBody>
-            </p:sp>
-            <p:sp>
-              <p:nvSpPr>
-                <p:cNvPr id="40" name="TextBox 39"/>
-                <p:cNvSpPr txBox="1"/>
-                <p:nvPr/>
-              </p:nvSpPr>
-              <p:spPr>
-                <a:xfrm>
-                  <a:off x="11487779" y="600878"/>
-                  <a:ext cx="744732" cy="305218"/>
-                </a:xfrm>
-                <a:prstGeom prst="rect">
-                  <a:avLst/>
-                </a:prstGeom>
-                <a:noFill/>
-              </p:spPr>
-              <p:txBody>
-                <a:bodyPr wrap="square" rtlCol="0">
-                  <a:spAutoFit/>
-                </a:bodyPr>
-                <a:lstStyle/>
-                <a:p>
-                  <a:r>
-                    <a:rPr lang="en-GB" sz="1400" dirty="0" smtClean="0"/>
-                    <a:t>Deaths</a:t>
-                  </a:r>
-                  <a:endParaRPr lang="en-GB" sz="1400" dirty="0"/>
-                </a:p>
-              </p:txBody>
-            </p:sp>
-          </p:grpSp>
-          <p:cxnSp>
-            <p:nvCxnSpPr>
-              <p:cNvPr id="41" name="Straight Arrow Connector 28"/>
-              <p:cNvCxnSpPr>
-                <a:stCxn id="37" idx="0"/>
-                <a:endCxn id="4" idx="0"/>
-              </p:cNvCxnSpPr>
-              <p:nvPr/>
-            </p:nvCxnSpPr>
-            <p:spPr>
-              <a:xfrm rot="16200000" flipH="1" flipV="1">
-                <a:off x="7400236" y="-2953045"/>
-                <a:ext cx="5247" cy="8136325"/>
-              </a:xfrm>
-              <a:prstGeom prst="curvedConnector3">
-                <a:avLst>
-                  <a:gd name="adj1" fmla="val -11327635"/>
-                </a:avLst>
-              </a:prstGeom>
-              <a:solidFill>
-                <a:srgbClr val="C00000"/>
-              </a:solidFill>
-              <a:ln w="50800">
-                <a:solidFill>
-                  <a:srgbClr val="C00000"/>
-                </a:solidFill>
-                <a:tailEnd type="triangle"/>
-              </a:ln>
-            </p:spPr>
-            <p:style>
-              <a:lnRef idx="1">
-                <a:schemeClr val="accent1"/>
-              </a:lnRef>
-              <a:fillRef idx="0">
-                <a:schemeClr val="accent1"/>
-              </a:fillRef>
-              <a:effectRef idx="0">
-                <a:schemeClr val="accent1"/>
-              </a:effectRef>
-              <a:fontRef idx="minor">
-                <a:schemeClr val="tx1"/>
-              </a:fontRef>
-            </p:style>
-          </p:cxnSp>
-        </p:grpSp>
         <p:cxnSp>
           <p:nvCxnSpPr>
-            <p:cNvPr id="158" name="Straight Arrow Connector 157"/>
+            <p:cNvPr id="38" name="Straight Arrow Connector 37"/>
             <p:cNvCxnSpPr/>
             <p:nvPr/>
           </p:nvCxnSpPr>
           <p:spPr>
             <a:xfrm>
-              <a:off x="9140687" y="2014112"/>
-              <a:ext cx="0" cy="348187"/>
+              <a:off x="9923820" y="1604239"/>
+              <a:ext cx="1062453" cy="0"/>
             </a:xfrm>
             <a:prstGeom prst="straightConnector1">
               <a:avLst/>
@@ -4703,36 +3375,1280 @@
             </a:fontRef>
           </p:style>
         </p:cxnSp>
-        <p:sp>
-          <p:nvSpPr>
-            <p:cNvPr id="161" name="TextBox 160"/>
-            <p:cNvSpPr txBox="1"/>
+        <p:cxnSp>
+          <p:nvCxnSpPr>
+            <p:cNvPr id="39" name="Straight Arrow Connector 38"/>
+            <p:cNvCxnSpPr/>
             <p:nvPr/>
-          </p:nvSpPr>
+          </p:nvCxnSpPr>
           <p:spPr>
-            <a:xfrm>
-              <a:off x="9190814" y="2096879"/>
-              <a:ext cx="916572" cy="307777"/>
+            <a:xfrm flipV="1">
+              <a:off x="11475730" y="769557"/>
+              <a:ext cx="0" cy="345808"/>
             </a:xfrm>
-            <a:prstGeom prst="rect">
+            <a:prstGeom prst="straightConnector1">
               <a:avLst/>
             </a:prstGeom>
-            <a:noFill/>
+            <a:solidFill>
+              <a:srgbClr val="C00000"/>
+            </a:solidFill>
+            <a:ln w="50800">
+              <a:solidFill>
+                <a:srgbClr val="C00000"/>
+              </a:solidFill>
+              <a:tailEnd type="triangle"/>
+            </a:ln>
           </p:spPr>
-          <p:txBody>
-            <a:bodyPr wrap="square" rtlCol="0">
-              <a:spAutoFit/>
-            </a:bodyPr>
-            <a:lstStyle/>
-            <a:p>
-              <a:r>
-                <a:rPr lang="en-GB" sz="1400" smtClean="0"/>
-                <a:t>TB Deaths</a:t>
-              </a:r>
-              <a:endParaRPr lang="en-GB" sz="1400" dirty="0"/>
-            </a:p>
-          </p:txBody>
-        </p:sp>
+          <p:style>
+            <a:lnRef idx="1">
+              <a:schemeClr val="accent1"/>
+            </a:lnRef>
+            <a:fillRef idx="0">
+              <a:schemeClr val="accent1"/>
+            </a:fillRef>
+            <a:effectRef idx="0">
+              <a:schemeClr val="accent1"/>
+            </a:effectRef>
+            <a:fontRef idx="minor">
+              <a:schemeClr val="tx1"/>
+            </a:fontRef>
+          </p:style>
+        </p:cxnSp>
+        <p:grpSp>
+          <p:nvGrpSpPr>
+            <p:cNvPr id="44" name="Group 43"/>
+            <p:cNvGrpSpPr/>
+            <p:nvPr/>
+          </p:nvGrpSpPr>
+          <p:grpSpPr>
+            <a:xfrm>
+              <a:off x="822573" y="578706"/>
+              <a:ext cx="11409938" cy="1984881"/>
+              <a:chOff x="822573" y="578706"/>
+              <a:chExt cx="11409938" cy="1984881"/>
+            </a:xfrm>
+          </p:grpSpPr>
+          <p:grpSp>
+            <p:nvGrpSpPr>
+              <p:cNvPr id="11" name="Group 10"/>
+              <p:cNvGrpSpPr/>
+              <p:nvPr/>
+            </p:nvGrpSpPr>
+            <p:grpSpPr>
+              <a:xfrm>
+                <a:off x="822573" y="578706"/>
+                <a:ext cx="9341963" cy="1984881"/>
+                <a:chOff x="781751" y="2007455"/>
+                <a:chExt cx="11229245" cy="2401826"/>
+              </a:xfrm>
+            </p:grpSpPr>
+            <p:grpSp>
+              <p:nvGrpSpPr>
+                <p:cNvPr id="9" name="Group 8"/>
+                <p:cNvGrpSpPr/>
+                <p:nvPr/>
+              </p:nvGrpSpPr>
+              <p:grpSpPr>
+                <a:xfrm>
+                  <a:off x="781751" y="2007455"/>
+                  <a:ext cx="11229245" cy="2401826"/>
+                  <a:chOff x="781751" y="2007455"/>
+                  <a:chExt cx="11229245" cy="2401826"/>
+                </a:xfrm>
+              </p:grpSpPr>
+              <p:sp>
+                <p:nvSpPr>
+                  <p:cNvPr id="28" name="TextBox 27"/>
+                  <p:cNvSpPr txBox="1"/>
+                  <p:nvPr/>
+                </p:nvSpPr>
+                <p:spPr>
+                  <a:xfrm>
+                    <a:off x="11115812" y="2034285"/>
+                    <a:ext cx="895184" cy="369332"/>
+                  </a:xfrm>
+                  <a:prstGeom prst="rect">
+                    <a:avLst/>
+                  </a:prstGeom>
+                  <a:noFill/>
+                </p:spPr>
+                <p:txBody>
+                  <a:bodyPr wrap="square" rtlCol="0">
+                    <a:spAutoFit/>
+                  </a:bodyPr>
+                  <a:lstStyle/>
+                  <a:p>
+                    <a:r>
+                      <a:rPr lang="en-GB" sz="1400" dirty="0" smtClean="0"/>
+                      <a:t>Deaths</a:t>
+                    </a:r>
+                    <a:endParaRPr lang="en-GB" sz="1400" dirty="0"/>
+                  </a:p>
+                </p:txBody>
+              </p:sp>
+              <p:grpSp>
+                <p:nvGrpSpPr>
+                  <p:cNvPr id="7" name="Group 6"/>
+                  <p:cNvGrpSpPr>
+                    <a:grpSpLocks noChangeAspect="1"/>
+                  </p:cNvGrpSpPr>
+                  <p:nvPr/>
+                </p:nvGrpSpPr>
+                <p:grpSpPr>
+                  <a:xfrm>
+                    <a:off x="781751" y="2007455"/>
+                    <a:ext cx="10939899" cy="2401826"/>
+                    <a:chOff x="781751" y="2007455"/>
+                    <a:chExt cx="10939899" cy="2401826"/>
+                  </a:xfrm>
+                </p:grpSpPr>
+                <p:grpSp>
+                  <p:nvGrpSpPr>
+                    <p:cNvPr id="36" name="Group 35"/>
+                    <p:cNvGrpSpPr>
+                      <a:grpSpLocks noChangeAspect="1"/>
+                    </p:cNvGrpSpPr>
+                    <p:nvPr/>
+                  </p:nvGrpSpPr>
+                  <p:grpSpPr>
+                    <a:xfrm>
+                      <a:off x="781751" y="2007455"/>
+                      <a:ext cx="8786793" cy="2401826"/>
+                      <a:chOff x="595994" y="1497565"/>
+                      <a:chExt cx="10857572" cy="2923272"/>
+                    </a:xfrm>
+                  </p:grpSpPr>
+                  <p:grpSp>
+                    <p:nvGrpSpPr>
+                      <p:cNvPr id="23" name="Group 22"/>
+                      <p:cNvGrpSpPr/>
+                      <p:nvPr/>
+                    </p:nvGrpSpPr>
+                    <p:grpSpPr>
+                      <a:xfrm>
+                        <a:off x="595994" y="1778645"/>
+                        <a:ext cx="10494191" cy="1952797"/>
+                        <a:chOff x="595994" y="1778645"/>
+                        <a:chExt cx="10494191" cy="1952797"/>
+                      </a:xfrm>
+                    </p:grpSpPr>
+                    <p:grpSp>
+                      <p:nvGrpSpPr>
+                        <p:cNvPr id="14" name="Group 13"/>
+                        <p:cNvGrpSpPr/>
+                        <p:nvPr/>
+                      </p:nvGrpSpPr>
+                      <p:grpSpPr>
+                        <a:xfrm>
+                          <a:off x="595994" y="2291442"/>
+                          <a:ext cx="10494191" cy="1440000"/>
+                          <a:chOff x="595994" y="2291442"/>
+                          <a:chExt cx="10494191" cy="1440000"/>
+                        </a:xfrm>
+                      </p:grpSpPr>
+                      <p:grpSp>
+                        <p:nvGrpSpPr>
+                          <p:cNvPr id="6" name="Group 5"/>
+                          <p:cNvGrpSpPr/>
+                          <p:nvPr/>
+                        </p:nvGrpSpPr>
+                        <p:grpSpPr>
+                          <a:xfrm>
+                            <a:off x="595994" y="2291442"/>
+                            <a:ext cx="10494191" cy="1440000"/>
+                            <a:chOff x="595994" y="2291442"/>
+                            <a:chExt cx="10494191" cy="1440000"/>
+                          </a:xfrm>
+                        </p:grpSpPr>
+                        <p:sp>
+                          <p:nvSpPr>
+                            <p:cNvPr id="2" name="Rounded Rectangle 1"/>
+                            <p:cNvSpPr/>
+                            <p:nvPr/>
+                          </p:nvSpPr>
+                          <p:spPr>
+                            <a:xfrm>
+                              <a:off x="595994" y="2291442"/>
+                              <a:ext cx="1440000" cy="1440000"/>
+                            </a:xfrm>
+                            <a:prstGeom prst="roundRect">
+                              <a:avLst/>
+                            </a:prstGeom>
+                            <a:solidFill>
+                              <a:srgbClr val="C00000"/>
+                            </a:solidFill>
+                          </p:spPr>
+                          <p:style>
+                            <a:lnRef idx="2">
+                              <a:schemeClr val="accent1">
+                                <a:shade val="50000"/>
+                              </a:schemeClr>
+                            </a:lnRef>
+                            <a:fillRef idx="1">
+                              <a:schemeClr val="accent1"/>
+                            </a:fillRef>
+                            <a:effectRef idx="0">
+                              <a:schemeClr val="accent1"/>
+                            </a:effectRef>
+                            <a:fontRef idx="minor">
+                              <a:schemeClr val="lt1"/>
+                            </a:fontRef>
+                          </p:style>
+                          <p:txBody>
+                            <a:bodyPr rtlCol="0" anchor="ctr"/>
+                            <a:lstStyle/>
+                            <a:p>
+                              <a:pPr algn="ctr"/>
+                              <a:r>
+                                <a:rPr lang="en-GB" sz="4000" dirty="0" smtClean="0">
+                                  <a:solidFill>
+                                    <a:schemeClr val="bg1"/>
+                                  </a:solidFill>
+                                </a:rPr>
+                                <a:t>S</a:t>
+                              </a:r>
+                              <a:r>
+                                <a:rPr lang="en-GB" sz="4000" baseline="-25000" dirty="0">
+                                  <a:solidFill>
+                                    <a:schemeClr val="bg1"/>
+                                  </a:solidFill>
+                                </a:rPr>
+                                <a:t>H</a:t>
+                              </a:r>
+                              <a:endParaRPr lang="en-GB" sz="4000" dirty="0">
+                                <a:solidFill>
+                                  <a:schemeClr val="bg1"/>
+                                </a:solidFill>
+                              </a:endParaRPr>
+                            </a:p>
+                          </p:txBody>
+                        </p:sp>
+                        <p:sp>
+                          <p:nvSpPr>
+                            <p:cNvPr id="3" name="Rounded Rectangle 2"/>
+                            <p:cNvSpPr/>
+                            <p:nvPr/>
+                          </p:nvSpPr>
+                          <p:spPr>
+                            <a:xfrm>
+                              <a:off x="6632122" y="2291442"/>
+                              <a:ext cx="1440000" cy="1440000"/>
+                            </a:xfrm>
+                            <a:prstGeom prst="roundRect">
+                              <a:avLst/>
+                            </a:prstGeom>
+                            <a:solidFill>
+                              <a:srgbClr val="C00000"/>
+                            </a:solidFill>
+                          </p:spPr>
+                          <p:style>
+                            <a:lnRef idx="2">
+                              <a:schemeClr val="accent1">
+                                <a:shade val="50000"/>
+                              </a:schemeClr>
+                            </a:lnRef>
+                            <a:fillRef idx="1">
+                              <a:schemeClr val="accent1"/>
+                            </a:fillRef>
+                            <a:effectRef idx="0">
+                              <a:schemeClr val="accent1"/>
+                            </a:effectRef>
+                            <a:fontRef idx="minor">
+                              <a:schemeClr val="lt1"/>
+                            </a:fontRef>
+                          </p:style>
+                          <p:txBody>
+                            <a:bodyPr rtlCol="0" anchor="ctr"/>
+                            <a:lstStyle/>
+                            <a:p>
+                              <a:pPr algn="ctr"/>
+                              <a:r>
+                                <a:rPr lang="en-GB" sz="4000" dirty="0" smtClean="0">
+                                  <a:solidFill>
+                                    <a:schemeClr val="bg1"/>
+                                  </a:solidFill>
+                                </a:rPr>
+                                <a:t>L</a:t>
+                              </a:r>
+                              <a:r>
+                                <a:rPr lang="en-GB" sz="4000" baseline="-25000" dirty="0">
+                                  <a:solidFill>
+                                    <a:schemeClr val="bg1"/>
+                                  </a:solidFill>
+                                </a:rPr>
+                                <a:t>H</a:t>
+                              </a:r>
+                              <a:endParaRPr lang="en-GB" sz="4000" dirty="0">
+                                <a:solidFill>
+                                  <a:schemeClr val="bg1"/>
+                                </a:solidFill>
+                              </a:endParaRPr>
+                            </a:p>
+                          </p:txBody>
+                        </p:sp>
+                        <p:sp>
+                          <p:nvSpPr>
+                            <p:cNvPr id="4" name="Rounded Rectangle 3"/>
+                            <p:cNvSpPr/>
+                            <p:nvPr/>
+                          </p:nvSpPr>
+                          <p:spPr>
+                            <a:xfrm>
+                              <a:off x="3607257" y="2291442"/>
+                              <a:ext cx="1440000" cy="1440000"/>
+                            </a:xfrm>
+                            <a:prstGeom prst="roundRect">
+                              <a:avLst/>
+                            </a:prstGeom>
+                            <a:solidFill>
+                              <a:srgbClr val="C00000"/>
+                            </a:solidFill>
+                          </p:spPr>
+                          <p:style>
+                            <a:lnRef idx="2">
+                              <a:schemeClr val="accent1">
+                                <a:shade val="50000"/>
+                              </a:schemeClr>
+                            </a:lnRef>
+                            <a:fillRef idx="1">
+                              <a:schemeClr val="accent1"/>
+                            </a:fillRef>
+                            <a:effectRef idx="0">
+                              <a:schemeClr val="accent1"/>
+                            </a:effectRef>
+                            <a:fontRef idx="minor">
+                              <a:schemeClr val="lt1"/>
+                            </a:fontRef>
+                          </p:style>
+                          <p:txBody>
+                            <a:bodyPr rtlCol="0" anchor="ctr"/>
+                            <a:lstStyle/>
+                            <a:p>
+                              <a:pPr algn="ctr"/>
+                              <a:r>
+                                <a:rPr lang="en-GB" sz="4000" dirty="0" smtClean="0">
+                                  <a:solidFill>
+                                    <a:schemeClr val="bg1"/>
+                                  </a:solidFill>
+                                </a:rPr>
+                                <a:t>H</a:t>
+                              </a:r>
+                              <a:r>
+                                <a:rPr lang="en-GB" sz="4000" baseline="-25000" dirty="0">
+                                  <a:solidFill>
+                                    <a:schemeClr val="bg1"/>
+                                  </a:solidFill>
+                                </a:rPr>
+                                <a:t>H</a:t>
+                              </a:r>
+                              <a:endParaRPr lang="en-GB" sz="4000" dirty="0">
+                                <a:solidFill>
+                                  <a:schemeClr val="bg1"/>
+                                </a:solidFill>
+                              </a:endParaRPr>
+                            </a:p>
+                          </p:txBody>
+                        </p:sp>
+                        <p:sp>
+                          <p:nvSpPr>
+                            <p:cNvPr id="5" name="Rounded Rectangle 4"/>
+                            <p:cNvSpPr/>
+                            <p:nvPr/>
+                          </p:nvSpPr>
+                          <p:spPr>
+                            <a:xfrm>
+                              <a:off x="9650185" y="2291442"/>
+                              <a:ext cx="1440000" cy="1440000"/>
+                            </a:xfrm>
+                            <a:prstGeom prst="roundRect">
+                              <a:avLst/>
+                            </a:prstGeom>
+                            <a:solidFill>
+                              <a:srgbClr val="C00000"/>
+                            </a:solidFill>
+                          </p:spPr>
+                          <p:style>
+                            <a:lnRef idx="2">
+                              <a:schemeClr val="accent1">
+                                <a:shade val="50000"/>
+                              </a:schemeClr>
+                            </a:lnRef>
+                            <a:fillRef idx="1">
+                              <a:schemeClr val="accent1"/>
+                            </a:fillRef>
+                            <a:effectRef idx="0">
+                              <a:schemeClr val="accent1"/>
+                            </a:effectRef>
+                            <a:fontRef idx="minor">
+                              <a:schemeClr val="lt1"/>
+                            </a:fontRef>
+                          </p:style>
+                          <p:txBody>
+                            <a:bodyPr rtlCol="0" anchor="ctr"/>
+                            <a:lstStyle/>
+                            <a:p>
+                              <a:pPr algn="ctr"/>
+                              <a:r>
+                                <a:rPr lang="en-GB" sz="4000" dirty="0" smtClean="0">
+                                  <a:solidFill>
+                                    <a:schemeClr val="bg1"/>
+                                  </a:solidFill>
+                                </a:rPr>
+                                <a:t>I</a:t>
+                              </a:r>
+                              <a:r>
+                                <a:rPr lang="en-GB" sz="4000" baseline="-25000" dirty="0">
+                                  <a:solidFill>
+                                    <a:schemeClr val="bg1"/>
+                                  </a:solidFill>
+                                </a:rPr>
+                                <a:t>H</a:t>
+                              </a:r>
+                              <a:endParaRPr lang="en-GB" sz="4000" dirty="0">
+                                <a:solidFill>
+                                  <a:schemeClr val="bg1"/>
+                                </a:solidFill>
+                              </a:endParaRPr>
+                            </a:p>
+                          </p:txBody>
+                        </p:sp>
+                      </p:grpSp>
+                      <p:cxnSp>
+                        <p:nvCxnSpPr>
+                          <p:cNvPr id="8" name="Straight Arrow Connector 7"/>
+                          <p:cNvCxnSpPr>
+                            <a:stCxn id="2" idx="3"/>
+                            <a:endCxn id="4" idx="1"/>
+                          </p:cNvCxnSpPr>
+                          <p:nvPr/>
+                        </p:nvCxnSpPr>
+                        <p:spPr>
+                          <a:xfrm>
+                            <a:off x="2035994" y="3011442"/>
+                            <a:ext cx="1571263" cy="0"/>
+                          </a:xfrm>
+                          <a:prstGeom prst="straightConnector1">
+                            <a:avLst/>
+                          </a:prstGeom>
+                          <a:ln w="50800">
+                            <a:solidFill>
+                              <a:srgbClr val="C00000"/>
+                            </a:solidFill>
+                            <a:tailEnd type="triangle"/>
+                          </a:ln>
+                        </p:spPr>
+                        <p:style>
+                          <a:lnRef idx="1">
+                            <a:schemeClr val="accent1"/>
+                          </a:lnRef>
+                          <a:fillRef idx="0">
+                            <a:schemeClr val="accent1"/>
+                          </a:fillRef>
+                          <a:effectRef idx="0">
+                            <a:schemeClr val="accent1"/>
+                          </a:effectRef>
+                          <a:fontRef idx="minor">
+                            <a:schemeClr val="tx1"/>
+                          </a:fontRef>
+                        </p:style>
+                      </p:cxnSp>
+                      <p:cxnSp>
+                        <p:nvCxnSpPr>
+                          <p:cNvPr id="10" name="Straight Arrow Connector 9"/>
+                          <p:cNvCxnSpPr>
+                            <a:stCxn id="4" idx="3"/>
+                            <a:endCxn id="3" idx="1"/>
+                          </p:cNvCxnSpPr>
+                          <p:nvPr/>
+                        </p:nvCxnSpPr>
+                        <p:spPr>
+                          <a:xfrm>
+                            <a:off x="5047257" y="3011442"/>
+                            <a:ext cx="1584865" cy="0"/>
+                          </a:xfrm>
+                          <a:prstGeom prst="straightConnector1">
+                            <a:avLst/>
+                          </a:prstGeom>
+                          <a:solidFill>
+                            <a:srgbClr val="C00000"/>
+                          </a:solidFill>
+                          <a:ln w="50800">
+                            <a:solidFill>
+                              <a:srgbClr val="C00000"/>
+                            </a:solidFill>
+                            <a:tailEnd type="triangle"/>
+                          </a:ln>
+                        </p:spPr>
+                        <p:style>
+                          <a:lnRef idx="1">
+                            <a:schemeClr val="accent1"/>
+                          </a:lnRef>
+                          <a:fillRef idx="0">
+                            <a:schemeClr val="accent1"/>
+                          </a:fillRef>
+                          <a:effectRef idx="0">
+                            <a:schemeClr val="accent1"/>
+                          </a:effectRef>
+                          <a:fontRef idx="minor">
+                            <a:schemeClr val="tx1"/>
+                          </a:fontRef>
+                        </p:style>
+                      </p:cxnSp>
+                      <p:cxnSp>
+                        <p:nvCxnSpPr>
+                          <p:cNvPr id="12" name="Straight Arrow Connector 11"/>
+                          <p:cNvCxnSpPr>
+                            <a:stCxn id="3" idx="3"/>
+                            <a:endCxn id="5" idx="1"/>
+                          </p:cNvCxnSpPr>
+                          <p:nvPr/>
+                        </p:nvCxnSpPr>
+                        <p:spPr>
+                          <a:xfrm>
+                            <a:off x="8072122" y="3011442"/>
+                            <a:ext cx="1578064" cy="0"/>
+                          </a:xfrm>
+                          <a:prstGeom prst="straightConnector1">
+                            <a:avLst/>
+                          </a:prstGeom>
+                          <a:solidFill>
+                            <a:srgbClr val="C00000"/>
+                          </a:solidFill>
+                          <a:ln w="50800">
+                            <a:solidFill>
+                              <a:srgbClr val="C00000"/>
+                            </a:solidFill>
+                            <a:tailEnd type="triangle"/>
+                          </a:ln>
+                        </p:spPr>
+                        <p:style>
+                          <a:lnRef idx="1">
+                            <a:schemeClr val="accent1"/>
+                          </a:lnRef>
+                          <a:fillRef idx="0">
+                            <a:schemeClr val="accent1"/>
+                          </a:fillRef>
+                          <a:effectRef idx="0">
+                            <a:schemeClr val="accent1"/>
+                          </a:effectRef>
+                          <a:fontRef idx="minor">
+                            <a:schemeClr val="tx1"/>
+                          </a:fontRef>
+                        </p:style>
+                      </p:cxnSp>
+                    </p:grpSp>
+                    <p:cxnSp>
+                      <p:nvCxnSpPr>
+                        <p:cNvPr id="16" name="Straight Arrow Connector 15"/>
+                        <p:cNvCxnSpPr>
+                          <a:stCxn id="2" idx="0"/>
+                        </p:cNvCxnSpPr>
+                        <p:nvPr/>
+                      </p:nvCxnSpPr>
+                      <p:spPr>
+                        <a:xfrm flipV="1">
+                          <a:off x="1315994" y="1782147"/>
+                          <a:ext cx="0" cy="509295"/>
+                        </a:xfrm>
+                        <a:prstGeom prst="straightConnector1">
+                          <a:avLst/>
+                        </a:prstGeom>
+                        <a:ln w="50800">
+                          <a:solidFill>
+                            <a:srgbClr val="C00000"/>
+                          </a:solidFill>
+                          <a:tailEnd type="triangle"/>
+                        </a:ln>
+                      </p:spPr>
+                      <p:style>
+                        <a:lnRef idx="1">
+                          <a:schemeClr val="accent1"/>
+                        </a:lnRef>
+                        <a:fillRef idx="0">
+                          <a:schemeClr val="accent1"/>
+                        </a:fillRef>
+                        <a:effectRef idx="0">
+                          <a:schemeClr val="accent1"/>
+                        </a:effectRef>
+                        <a:fontRef idx="minor">
+                          <a:schemeClr val="tx1"/>
+                        </a:fontRef>
+                      </p:style>
+                    </p:cxnSp>
+                    <p:cxnSp>
+                      <p:nvCxnSpPr>
+                        <p:cNvPr id="20" name="Straight Arrow Connector 19"/>
+                        <p:cNvCxnSpPr>
+                          <a:stCxn id="20" idx="0"/>
+                        </p:cNvCxnSpPr>
+                        <p:nvPr/>
+                      </p:nvCxnSpPr>
+                      <p:spPr>
+                        <a:xfrm flipV="1">
+                          <a:off x="4328215" y="1782146"/>
+                          <a:ext cx="0" cy="509295"/>
+                        </a:xfrm>
+                        <a:prstGeom prst="straightConnector1">
+                          <a:avLst/>
+                        </a:prstGeom>
+                        <a:ln w="50800">
+                          <a:solidFill>
+                            <a:srgbClr val="C00000"/>
+                          </a:solidFill>
+                          <a:tailEnd type="triangle"/>
+                        </a:ln>
+                      </p:spPr>
+                      <p:style>
+                        <a:lnRef idx="1">
+                          <a:schemeClr val="accent1"/>
+                        </a:lnRef>
+                        <a:fillRef idx="0">
+                          <a:schemeClr val="accent1"/>
+                        </a:fillRef>
+                        <a:effectRef idx="0">
+                          <a:schemeClr val="accent1"/>
+                        </a:effectRef>
+                        <a:fontRef idx="minor">
+                          <a:schemeClr val="tx1"/>
+                        </a:fontRef>
+                      </p:style>
+                    </p:cxnSp>
+                    <p:cxnSp>
+                      <p:nvCxnSpPr>
+                        <p:cNvPr id="21" name="Straight Arrow Connector 20"/>
+                        <p:cNvCxnSpPr>
+                          <a:stCxn id="21" idx="0"/>
+                        </p:cNvCxnSpPr>
+                        <p:nvPr/>
+                      </p:nvCxnSpPr>
+                      <p:spPr>
+                        <a:xfrm flipV="1">
+                          <a:off x="7352122" y="1778646"/>
+                          <a:ext cx="0" cy="509295"/>
+                        </a:xfrm>
+                        <a:prstGeom prst="straightConnector1">
+                          <a:avLst/>
+                        </a:prstGeom>
+                        <a:ln w="50800">
+                          <a:solidFill>
+                            <a:srgbClr val="C00000"/>
+                          </a:solidFill>
+                          <a:tailEnd type="triangle"/>
+                        </a:ln>
+                      </p:spPr>
+                      <p:style>
+                        <a:lnRef idx="1">
+                          <a:schemeClr val="accent1"/>
+                        </a:lnRef>
+                        <a:fillRef idx="0">
+                          <a:schemeClr val="accent1"/>
+                        </a:fillRef>
+                        <a:effectRef idx="0">
+                          <a:schemeClr val="accent1"/>
+                        </a:effectRef>
+                        <a:fontRef idx="minor">
+                          <a:schemeClr val="tx1"/>
+                        </a:fontRef>
+                      </p:style>
+                    </p:cxnSp>
+                    <p:cxnSp>
+                      <p:nvCxnSpPr>
+                        <p:cNvPr id="22" name="Straight Arrow Connector 21"/>
+                        <p:cNvCxnSpPr>
+                          <a:stCxn id="22" idx="0"/>
+                        </p:cNvCxnSpPr>
+                        <p:nvPr/>
+                      </p:nvCxnSpPr>
+                      <p:spPr>
+                        <a:xfrm flipV="1">
+                          <a:off x="10370186" y="1778645"/>
+                          <a:ext cx="0" cy="509295"/>
+                        </a:xfrm>
+                        <a:prstGeom prst="straightConnector1">
+                          <a:avLst/>
+                        </a:prstGeom>
+                        <a:ln w="50800">
+                          <a:solidFill>
+                            <a:srgbClr val="C00000"/>
+                          </a:solidFill>
+                          <a:tailEnd type="triangle"/>
+                        </a:ln>
+                      </p:spPr>
+                      <p:style>
+                        <a:lnRef idx="1">
+                          <a:schemeClr val="accent1"/>
+                        </a:lnRef>
+                        <a:fillRef idx="0">
+                          <a:schemeClr val="accent1"/>
+                        </a:fillRef>
+                        <a:effectRef idx="0">
+                          <a:schemeClr val="accent1"/>
+                        </a:effectRef>
+                        <a:fontRef idx="minor">
+                          <a:schemeClr val="tx1"/>
+                        </a:fontRef>
+                      </p:style>
+                    </p:cxnSp>
+                  </p:grpSp>
+                  <p:cxnSp>
+                    <p:nvCxnSpPr>
+                      <p:cNvPr id="25" name="Straight Arrow Connector 24"/>
+                      <p:cNvCxnSpPr>
+                        <a:endCxn id="2" idx="2"/>
+                      </p:cNvCxnSpPr>
+                      <p:nvPr/>
+                    </p:nvCxnSpPr>
+                    <p:spPr>
+                      <a:xfrm flipV="1">
+                        <a:off x="1315994" y="3731442"/>
+                        <a:ext cx="0" cy="509295"/>
+                      </a:xfrm>
+                      <a:prstGeom prst="straightConnector1">
+                        <a:avLst/>
+                      </a:prstGeom>
+                      <a:ln w="50800">
+                        <a:solidFill>
+                          <a:srgbClr val="C00000"/>
+                        </a:solidFill>
+                        <a:tailEnd type="triangle"/>
+                      </a:ln>
+                    </p:spPr>
+                    <p:style>
+                      <a:lnRef idx="1">
+                        <a:schemeClr val="accent1"/>
+                      </a:lnRef>
+                      <a:fillRef idx="0">
+                        <a:schemeClr val="accent1"/>
+                      </a:fillRef>
+                      <a:effectRef idx="0">
+                        <a:schemeClr val="accent1"/>
+                      </a:effectRef>
+                      <a:fontRef idx="minor">
+                        <a:schemeClr val="tx1"/>
+                      </a:fontRef>
+                    </p:style>
+                  </p:cxnSp>
+                  <p:sp>
+                    <p:nvSpPr>
+                      <p:cNvPr id="31" name="TextBox 30"/>
+                      <p:cNvSpPr txBox="1"/>
+                      <p:nvPr/>
+                    </p:nvSpPr>
+                    <p:spPr>
+                      <a:xfrm>
+                        <a:off x="1390450" y="1497565"/>
+                        <a:ext cx="1245889" cy="449515"/>
+                      </a:xfrm>
+                      <a:prstGeom prst="rect">
+                        <a:avLst/>
+                      </a:prstGeom>
+                      <a:noFill/>
+                    </p:spPr>
+                    <p:txBody>
+                      <a:bodyPr wrap="square" rtlCol="0">
+                        <a:spAutoFit/>
+                      </a:bodyPr>
+                      <a:lstStyle/>
+                      <a:p>
+                        <a:r>
+                          <a:rPr lang="en-GB" sz="1400" dirty="0" smtClean="0"/>
+                          <a:t>Deaths</a:t>
+                        </a:r>
+                        <a:endParaRPr lang="en-GB" sz="1400" dirty="0"/>
+                      </a:p>
+                    </p:txBody>
+                  </p:sp>
+                  <p:sp>
+                    <p:nvSpPr>
+                      <p:cNvPr id="32" name="TextBox 31"/>
+                      <p:cNvSpPr txBox="1"/>
+                      <p:nvPr/>
+                    </p:nvSpPr>
+                    <p:spPr>
+                      <a:xfrm>
+                        <a:off x="4408514" y="1530220"/>
+                        <a:ext cx="1103008" cy="449515"/>
+                      </a:xfrm>
+                      <a:prstGeom prst="rect">
+                        <a:avLst/>
+                      </a:prstGeom>
+                      <a:noFill/>
+                    </p:spPr>
+                    <p:txBody>
+                      <a:bodyPr wrap="square" rtlCol="0">
+                        <a:spAutoFit/>
+                      </a:bodyPr>
+                      <a:lstStyle/>
+                      <a:p>
+                        <a:r>
+                          <a:rPr lang="en-GB" sz="1400" dirty="0" smtClean="0"/>
+                          <a:t>Deaths</a:t>
+                        </a:r>
+                        <a:endParaRPr lang="en-GB" sz="1400" dirty="0"/>
+                      </a:p>
+                    </p:txBody>
+                  </p:sp>
+                  <p:sp>
+                    <p:nvSpPr>
+                      <p:cNvPr id="33" name="TextBox 32"/>
+                      <p:cNvSpPr txBox="1"/>
+                      <p:nvPr/>
+                    </p:nvSpPr>
+                    <p:spPr>
+                      <a:xfrm>
+                        <a:off x="7377947" y="1497565"/>
+                        <a:ext cx="1128864" cy="449515"/>
+                      </a:xfrm>
+                      <a:prstGeom prst="rect">
+                        <a:avLst/>
+                      </a:prstGeom>
+                      <a:noFill/>
+                    </p:spPr>
+                    <p:txBody>
+                      <a:bodyPr wrap="square" rtlCol="0">
+                        <a:spAutoFit/>
+                      </a:bodyPr>
+                      <a:lstStyle/>
+                      <a:p>
+                        <a:r>
+                          <a:rPr lang="en-GB" sz="1400" dirty="0" smtClean="0"/>
+                          <a:t>Deaths</a:t>
+                        </a:r>
+                        <a:endParaRPr lang="en-GB" sz="1400" dirty="0"/>
+                      </a:p>
+                    </p:txBody>
+                  </p:sp>
+                  <p:sp>
+                    <p:nvSpPr>
+                      <p:cNvPr id="34" name="TextBox 33"/>
+                      <p:cNvSpPr txBox="1"/>
+                      <p:nvPr/>
+                    </p:nvSpPr>
+                    <p:spPr>
+                      <a:xfrm>
+                        <a:off x="10347414" y="1530220"/>
+                        <a:ext cx="1106152" cy="449515"/>
+                      </a:xfrm>
+                      <a:prstGeom prst="rect">
+                        <a:avLst/>
+                      </a:prstGeom>
+                      <a:noFill/>
+                    </p:spPr>
+                    <p:txBody>
+                      <a:bodyPr wrap="square" rtlCol="0">
+                        <a:spAutoFit/>
+                      </a:bodyPr>
+                      <a:lstStyle/>
+                      <a:p>
+                        <a:r>
+                          <a:rPr lang="en-GB" sz="1400" dirty="0" smtClean="0"/>
+                          <a:t>Deaths</a:t>
+                        </a:r>
+                        <a:endParaRPr lang="en-GB" sz="1400" dirty="0"/>
+                      </a:p>
+                    </p:txBody>
+                  </p:sp>
+                  <p:sp>
+                    <p:nvSpPr>
+                      <p:cNvPr id="35" name="TextBox 34"/>
+                      <p:cNvSpPr txBox="1"/>
+                      <p:nvPr/>
+                    </p:nvSpPr>
+                    <p:spPr>
+                      <a:xfrm>
+                        <a:off x="1390450" y="3971322"/>
+                        <a:ext cx="953326" cy="449515"/>
+                      </a:xfrm>
+                      <a:prstGeom prst="rect">
+                        <a:avLst/>
+                      </a:prstGeom>
+                      <a:noFill/>
+                    </p:spPr>
+                    <p:txBody>
+                      <a:bodyPr wrap="square" rtlCol="0">
+                        <a:spAutoFit/>
+                      </a:bodyPr>
+                      <a:lstStyle/>
+                      <a:p>
+                        <a:r>
+                          <a:rPr lang="en-GB" sz="1400" dirty="0" smtClean="0"/>
+                          <a:t>Births</a:t>
+                        </a:r>
+                        <a:endParaRPr lang="en-GB" sz="1400" dirty="0"/>
+                      </a:p>
+                    </p:txBody>
+                  </p:sp>
+                </p:grpSp>
+                <p:sp>
+                  <p:nvSpPr>
+                    <p:cNvPr id="24" name="Rounded Rectangle 23"/>
+                    <p:cNvSpPr/>
+                    <p:nvPr/>
+                  </p:nvSpPr>
+                  <p:spPr>
+                    <a:xfrm>
+                      <a:off x="10556290" y="2656845"/>
+                      <a:ext cx="1165360" cy="1183136"/>
+                    </a:xfrm>
+                    <a:prstGeom prst="roundRect">
+                      <a:avLst/>
+                    </a:prstGeom>
+                    <a:solidFill>
+                      <a:srgbClr val="C00000"/>
+                    </a:solidFill>
+                  </p:spPr>
+                  <p:style>
+                    <a:lnRef idx="2">
+                      <a:schemeClr val="accent1">
+                        <a:shade val="50000"/>
+                      </a:schemeClr>
+                    </a:lnRef>
+                    <a:fillRef idx="1">
+                      <a:schemeClr val="accent1"/>
+                    </a:fillRef>
+                    <a:effectRef idx="0">
+                      <a:schemeClr val="accent1"/>
+                    </a:effectRef>
+                    <a:fontRef idx="minor">
+                      <a:schemeClr val="lt1"/>
+                    </a:fontRef>
+                  </p:style>
+                  <p:txBody>
+                    <a:bodyPr rtlCol="0" anchor="ctr"/>
+                    <a:lstStyle/>
+                    <a:p>
+                      <a:pPr algn="ctr"/>
+                      <a:r>
+                        <a:rPr lang="en-GB" sz="4000" dirty="0" smtClean="0">
+                          <a:solidFill>
+                            <a:schemeClr val="bg1"/>
+                          </a:solidFill>
+                        </a:rPr>
+                        <a:t>T</a:t>
+                      </a:r>
+                      <a:r>
+                        <a:rPr lang="en-GB" sz="4000" baseline="-25000" dirty="0">
+                          <a:solidFill>
+                            <a:schemeClr val="bg1"/>
+                          </a:solidFill>
+                        </a:rPr>
+                        <a:t>H</a:t>
+                      </a:r>
+                      <a:endParaRPr lang="en-GB" sz="4000" dirty="0">
+                        <a:solidFill>
+                          <a:schemeClr val="bg1"/>
+                        </a:solidFill>
+                      </a:endParaRPr>
+                    </a:p>
+                  </p:txBody>
+                </p:sp>
+                <p:cxnSp>
+                  <p:nvCxnSpPr>
+                    <p:cNvPr id="26" name="Straight Arrow Connector 25"/>
+                    <p:cNvCxnSpPr/>
+                    <p:nvPr/>
+                  </p:nvCxnSpPr>
+                  <p:spPr>
+                    <a:xfrm>
+                      <a:off x="9274469" y="3251291"/>
+                      <a:ext cx="1277092" cy="0"/>
+                    </a:xfrm>
+                    <a:prstGeom prst="straightConnector1">
+                      <a:avLst/>
+                    </a:prstGeom>
+                    <a:solidFill>
+                      <a:srgbClr val="C00000"/>
+                    </a:solidFill>
+                    <a:ln w="50800">
+                      <a:solidFill>
+                        <a:srgbClr val="C00000"/>
+                      </a:solidFill>
+                      <a:tailEnd type="triangle"/>
+                    </a:ln>
+                  </p:spPr>
+                  <p:style>
+                    <a:lnRef idx="1">
+                      <a:schemeClr val="accent1"/>
+                    </a:lnRef>
+                    <a:fillRef idx="0">
+                      <a:schemeClr val="accent1"/>
+                    </a:fillRef>
+                    <a:effectRef idx="0">
+                      <a:schemeClr val="accent1"/>
+                    </a:effectRef>
+                    <a:fontRef idx="minor">
+                      <a:schemeClr val="tx1"/>
+                    </a:fontRef>
+                  </p:style>
+                </p:cxnSp>
+                <p:cxnSp>
+                  <p:nvCxnSpPr>
+                    <p:cNvPr id="27" name="Straight Arrow Connector 26"/>
+                    <p:cNvCxnSpPr/>
+                    <p:nvPr/>
+                  </p:nvCxnSpPr>
+                  <p:spPr>
+                    <a:xfrm flipV="1">
+                      <a:off x="11138970" y="2238397"/>
+                      <a:ext cx="0" cy="418448"/>
+                    </a:xfrm>
+                    <a:prstGeom prst="straightConnector1">
+                      <a:avLst/>
+                    </a:prstGeom>
+                    <a:solidFill>
+                      <a:srgbClr val="C00000"/>
+                    </a:solidFill>
+                    <a:ln w="50800">
+                      <a:solidFill>
+                        <a:srgbClr val="C00000"/>
+                      </a:solidFill>
+                      <a:tailEnd type="triangle"/>
+                    </a:ln>
+                  </p:spPr>
+                  <p:style>
+                    <a:lnRef idx="1">
+                      <a:schemeClr val="accent1"/>
+                    </a:lnRef>
+                    <a:fillRef idx="0">
+                      <a:schemeClr val="accent1"/>
+                    </a:fillRef>
+                    <a:effectRef idx="0">
+                      <a:schemeClr val="accent1"/>
+                    </a:effectRef>
+                    <a:fontRef idx="minor">
+                      <a:schemeClr val="tx1"/>
+                    </a:fontRef>
+                  </p:style>
+                </p:cxnSp>
+                <p:cxnSp>
+                  <p:nvCxnSpPr>
+                    <p:cNvPr id="29" name="Straight Arrow Connector 28"/>
+                    <p:cNvCxnSpPr>
+                      <a:stCxn id="4" idx="2"/>
+                      <a:endCxn id="5" idx="2"/>
+                    </p:cNvCxnSpPr>
+                    <p:nvPr/>
+                  </p:nvCxnSpPr>
+                  <p:spPr>
+                    <a:xfrm rot="16200000" flipH="1">
+                      <a:off x="6246584" y="1397654"/>
+                      <a:ext cx="12700" cy="4890409"/>
+                    </a:xfrm>
+                    <a:prstGeom prst="curvedConnector3">
+                      <a:avLst>
+                        <a:gd name="adj1" fmla="val 6271575"/>
+                      </a:avLst>
+                    </a:prstGeom>
+                    <a:solidFill>
+                      <a:srgbClr val="C00000"/>
+                    </a:solidFill>
+                    <a:ln w="50800">
+                      <a:solidFill>
+                        <a:srgbClr val="C00000"/>
+                      </a:solidFill>
+                      <a:tailEnd type="triangle"/>
+                    </a:ln>
+                  </p:spPr>
+                  <p:style>
+                    <a:lnRef idx="1">
+                      <a:schemeClr val="accent1"/>
+                    </a:lnRef>
+                    <a:fillRef idx="0">
+                      <a:schemeClr val="accent1"/>
+                    </a:fillRef>
+                    <a:effectRef idx="0">
+                      <a:schemeClr val="accent1"/>
+                    </a:effectRef>
+                    <a:fontRef idx="minor">
+                      <a:schemeClr val="tx1"/>
+                    </a:fontRef>
+                  </p:style>
+                </p:cxnSp>
+              </p:grpSp>
+            </p:grpSp>
+            <p:cxnSp>
+              <p:nvCxnSpPr>
+                <p:cNvPr id="30" name="Straight Arrow Connector 29"/>
+                <p:cNvCxnSpPr>
+                  <a:stCxn id="3" idx="2"/>
+                  <a:endCxn id="4" idx="2"/>
+                </p:cNvCxnSpPr>
+                <p:nvPr/>
+              </p:nvCxnSpPr>
+              <p:spPr>
+                <a:xfrm rot="5400000">
+                  <a:off x="5025358" y="2618881"/>
+                  <a:ext cx="12700" cy="2447956"/>
+                </a:xfrm>
+                <a:prstGeom prst="curvedConnector3">
+                  <a:avLst>
+                    <a:gd name="adj1" fmla="val 2103157"/>
+                  </a:avLst>
+                </a:prstGeom>
+                <a:solidFill>
+                  <a:srgbClr val="C00000"/>
+                </a:solidFill>
+                <a:ln w="50800">
+                  <a:solidFill>
+                    <a:srgbClr val="C00000"/>
+                  </a:solidFill>
+                  <a:tailEnd type="triangle"/>
+                </a:ln>
+              </p:spPr>
+              <p:style>
+                <a:lnRef idx="1">
+                  <a:schemeClr val="accent1"/>
+                </a:lnRef>
+                <a:fillRef idx="0">
+                  <a:schemeClr val="accent1"/>
+                </a:fillRef>
+                <a:effectRef idx="0">
+                  <a:schemeClr val="accent1"/>
+                </a:effectRef>
+                <a:fontRef idx="minor">
+                  <a:schemeClr val="tx1"/>
+                </a:fontRef>
+              </p:style>
+            </p:cxnSp>
+          </p:grpSp>
+          <p:sp>
+            <p:nvSpPr>
+              <p:cNvPr id="37" name="Rounded Rectangle 36"/>
+              <p:cNvSpPr/>
+              <p:nvPr/>
+            </p:nvSpPr>
+            <p:spPr>
+              <a:xfrm>
+                <a:off x="10986272" y="1112495"/>
+                <a:ext cx="969500" cy="977749"/>
+              </a:xfrm>
+              <a:prstGeom prst="roundRect">
+                <a:avLst/>
+              </a:prstGeom>
+              <a:solidFill>
+                <a:srgbClr val="C00000"/>
+              </a:solidFill>
+            </p:spPr>
+            <p:style>
+              <a:lnRef idx="2">
+                <a:schemeClr val="accent1">
+                  <a:shade val="50000"/>
+                </a:schemeClr>
+              </a:lnRef>
+              <a:fillRef idx="1">
+                <a:schemeClr val="accent1"/>
+              </a:fillRef>
+              <a:effectRef idx="0">
+                <a:schemeClr val="accent1"/>
+              </a:effectRef>
+              <a:fontRef idx="minor">
+                <a:schemeClr val="lt1"/>
+              </a:fontRef>
+            </p:style>
+            <p:txBody>
+              <a:bodyPr rtlCol="0" anchor="ctr"/>
+              <a:lstStyle/>
+              <a:p>
+                <a:pPr algn="ctr"/>
+                <a:r>
+                  <a:rPr lang="en-GB" sz="4000" dirty="0" smtClean="0">
+                    <a:solidFill>
+                      <a:schemeClr val="bg1"/>
+                    </a:solidFill>
+                  </a:rPr>
+                  <a:t>R</a:t>
+                </a:r>
+                <a:r>
+                  <a:rPr lang="en-GB" sz="4000" baseline="-25000" dirty="0">
+                    <a:solidFill>
+                      <a:schemeClr val="bg1"/>
+                    </a:solidFill>
+                  </a:rPr>
+                  <a:t>H</a:t>
+                </a:r>
+                <a:endParaRPr lang="en-GB" sz="4000" dirty="0">
+                  <a:solidFill>
+                    <a:schemeClr val="bg1"/>
+                  </a:solidFill>
+                </a:endParaRPr>
+              </a:p>
+            </p:txBody>
+          </p:sp>
+          <p:sp>
+            <p:nvSpPr>
+              <p:cNvPr id="40" name="TextBox 39"/>
+              <p:cNvSpPr txBox="1"/>
+              <p:nvPr/>
+            </p:nvSpPr>
+            <p:spPr>
+              <a:xfrm>
+                <a:off x="11487779" y="600878"/>
+                <a:ext cx="744732" cy="305218"/>
+              </a:xfrm>
+              <a:prstGeom prst="rect">
+                <a:avLst/>
+              </a:prstGeom>
+              <a:noFill/>
+            </p:spPr>
+            <p:txBody>
+              <a:bodyPr wrap="square" rtlCol="0">
+                <a:spAutoFit/>
+              </a:bodyPr>
+              <a:lstStyle/>
+              <a:p>
+                <a:r>
+                  <a:rPr lang="en-GB" sz="1400" dirty="0" smtClean="0"/>
+                  <a:t>Deaths</a:t>
+                </a:r>
+                <a:endParaRPr lang="en-GB" sz="1400" dirty="0"/>
+              </a:p>
+            </p:txBody>
+          </p:sp>
+        </p:grpSp>
+        <p:cxnSp>
+          <p:nvCxnSpPr>
+            <p:cNvPr id="41" name="Straight Arrow Connector 28"/>
+            <p:cNvCxnSpPr>
+              <a:stCxn id="37" idx="0"/>
+              <a:endCxn id="4" idx="0"/>
+            </p:cNvCxnSpPr>
+            <p:nvPr/>
+          </p:nvCxnSpPr>
+          <p:spPr>
+            <a:xfrm rot="16200000" flipH="1" flipV="1">
+              <a:off x="7400236" y="-2953045"/>
+              <a:ext cx="5247" cy="8136325"/>
+            </a:xfrm>
+            <a:prstGeom prst="curvedConnector3">
+              <a:avLst>
+                <a:gd name="adj1" fmla="val -11327635"/>
+              </a:avLst>
+            </a:prstGeom>
+            <a:solidFill>
+              <a:srgbClr val="C00000"/>
+            </a:solidFill>
+            <a:ln w="50800">
+              <a:solidFill>
+                <a:srgbClr val="C00000"/>
+              </a:solidFill>
+              <a:tailEnd type="triangle"/>
+            </a:ln>
+          </p:spPr>
+          <p:style>
+            <a:lnRef idx="1">
+              <a:schemeClr val="accent1"/>
+            </a:lnRef>
+            <a:fillRef idx="0">
+              <a:schemeClr val="accent1"/>
+            </a:fillRef>
+            <a:effectRef idx="0">
+              <a:schemeClr val="accent1"/>
+            </a:effectRef>
+            <a:fontRef idx="minor">
+              <a:schemeClr val="tx1"/>
+            </a:fontRef>
+          </p:style>
+        </p:cxnSp>
       </p:grpSp>
       <p:grpSp>
         <p:nvGrpSpPr>

</xml_diff>